<commit_message>
update ppt for presentation in thusday
</commit_message>
<xml_diff>
--- a/lab/all you need/Attention Is All You Need.pptx
+++ b/lab/all you need/Attention Is All You Need.pptx
@@ -22,8 +22,7 @@
     <p:sldId id="260" r:id="rId14"/>
     <p:sldId id="261" r:id="rId15"/>
     <p:sldId id="262" r:id="rId17"/>
-    <p:sldId id="263" r:id="rId18"/>
-    <p:sldId id="264" r:id="rId19"/>
+    <p:sldId id="264" r:id="rId18"/>
   </p:sldIdLst>
   <p:sldSz cx="12192000" cy="6858000"/>
   <p:notesSz cx="6858000" cy="9144000"/>
@@ -1405,8 +1404,16 @@
 </file>
 
 <file path=ppt/slideLayouts/slideLayout1.xml><?xml version="1.0" encoding="utf-8"?>
-<p:sldLayout xmlns:a="http://schemas.openxmlformats.org/drawingml/2006/main" xmlns:r="http://schemas.openxmlformats.org/officeDocument/2006/relationships" xmlns:p="http://schemas.openxmlformats.org/presentationml/2006/main" type="title" preserve="1">
+<p:sldLayout xmlns:a="http://schemas.openxmlformats.org/drawingml/2006/main" xmlns:r="http://schemas.openxmlformats.org/officeDocument/2006/relationships" xmlns:p="http://schemas.openxmlformats.org/presentationml/2006/main" type="title" preserve="1" showMasterSp="0">
   <p:cSld name="Title Slide">
+    <p:bg>
+      <p:bgPr>
+        <a:solidFill>
+          <a:schemeClr val="bg1"/>
+        </a:solidFill>
+        <a:effectLst/>
+      </p:bgPr>
+    </p:bg>
     <p:spTree>
       <p:nvGrpSpPr>
         <p:cNvPr id="1" name=""/>
@@ -1421,11 +1428,40 @@
           <a:chExt cx="0" cy="0"/>
         </a:xfrm>
       </p:grpSpPr>
+      <p:pic>
+        <p:nvPicPr>
+          <p:cNvPr id="2050" name="Picture 2"/>
+          <p:cNvPicPr>
+            <a:picLocks noChangeAspect="1"/>
+          </p:cNvPicPr>
+          <p:nvPr/>
+        </p:nvPicPr>
+        <p:blipFill>
+          <a:blip r:embed="rId2"/>
+          <a:srcRect b="3795"/>
+          <a:stretch>
+            <a:fillRect/>
+          </a:stretch>
+        </p:blipFill>
+        <p:spPr>
+          <a:xfrm>
+            <a:off x="0" y="260350"/>
+            <a:ext cx="12192000" cy="6597650"/>
+          </a:xfrm>
+          <a:prstGeom prst="rect">
+            <a:avLst/>
+          </a:prstGeom>
+          <a:noFill/>
+          <a:ln w="9525">
+            <a:noFill/>
+          </a:ln>
+        </p:spPr>
+      </p:pic>
       <p:sp>
         <p:nvSpPr>
-          <p:cNvPr id="2" name="Title 1"/>
+          <p:cNvPr id="2051" name="Rectangle 3"/>
           <p:cNvSpPr>
-            <a:spLocks noGrp="1"/>
+            <a:spLocks noGrp="1" noChangeArrowheads="1"/>
           </p:cNvSpPr>
           <p:nvPr>
             <p:ph type="ctrTitle"/>
@@ -1433,31 +1469,32 @@
         </p:nvSpPr>
         <p:spPr>
           <a:xfrm>
-            <a:off x="1524000" y="1122363"/>
-            <a:ext cx="9144000" cy="2387600"/>
+            <a:off x="624417" y="620713"/>
+            <a:ext cx="10943167" cy="1082675"/>
           </a:xfrm>
         </p:spPr>
         <p:txBody>
-          <a:bodyPr anchor="b"/>
+          <a:bodyPr/>
           <a:lstStyle>
-            <a:lvl1pPr algn="ctr">
-              <a:defRPr sz="6000"/>
+            <a:lvl1pPr>
+              <a:defRPr/>
             </a:lvl1pPr>
           </a:lstStyle>
           <a:p>
-            <a:r>
-              <a:rPr lang="en-US"/>
+            <a:pPr lvl="0"/>
+            <a:r>
+              <a:rPr lang="en-US" altLang="zh-CN" noProof="0" smtClean="0"/>
               <a:t>Click to edit Master title style</a:t>
             </a:r>
-            <a:endParaRPr lang="en-US"/>
+            <a:endParaRPr lang="en-US" altLang="zh-CN" noProof="0" smtClean="0"/>
           </a:p>
         </p:txBody>
       </p:sp>
       <p:sp>
         <p:nvSpPr>
-          <p:cNvPr id="3" name="Subtitle 2"/>
+          <p:cNvPr id="2052" name="Rectangle 4"/>
           <p:cNvSpPr>
-            <a:spLocks noGrp="1"/>
+            <a:spLocks noGrp="1" noChangeArrowheads="1"/>
           </p:cNvSpPr>
           <p:nvPr>
             <p:ph type="subTitle" idx="1"/>
@@ -1465,73 +1502,84 @@
         </p:nvSpPr>
         <p:spPr>
           <a:xfrm>
-            <a:off x="1524000" y="3602038"/>
-            <a:ext cx="9144000" cy="1655762"/>
+            <a:off x="626533" y="1843088"/>
+            <a:ext cx="10949517" cy="981075"/>
           </a:xfrm>
         </p:spPr>
         <p:txBody>
           <a:bodyPr/>
           <a:lstStyle>
-            <a:lvl1pPr marL="0" indent="0" algn="ctr">
+            <a:lvl1pPr marL="0" indent="0">
+              <a:buFontTx/>
               <a:buNone/>
-              <a:defRPr sz="2400"/>
+              <a:defRPr/>
             </a:lvl1pPr>
-            <a:lvl2pPr marL="457200" indent="0" algn="ctr">
-              <a:buNone/>
-              <a:defRPr sz="2000"/>
-            </a:lvl2pPr>
-            <a:lvl3pPr marL="914400" indent="0" algn="ctr">
-              <a:buNone/>
-              <a:defRPr sz="1800"/>
-            </a:lvl3pPr>
-            <a:lvl4pPr marL="1371600" indent="0" algn="ctr">
-              <a:buNone/>
-              <a:defRPr sz="1600"/>
-            </a:lvl4pPr>
-            <a:lvl5pPr marL="1828800" indent="0" algn="ctr">
-              <a:buNone/>
-              <a:defRPr sz="1600"/>
-            </a:lvl5pPr>
-            <a:lvl6pPr marL="2286000" indent="0" algn="ctr">
-              <a:buNone/>
-              <a:defRPr sz="1600"/>
-            </a:lvl6pPr>
-            <a:lvl7pPr marL="2743200" indent="0" algn="ctr">
-              <a:buNone/>
-              <a:defRPr sz="1600"/>
-            </a:lvl7pPr>
-            <a:lvl8pPr marL="3200400" indent="0" algn="ctr">
-              <a:buNone/>
-              <a:defRPr sz="1600"/>
-            </a:lvl8pPr>
-            <a:lvl9pPr marL="3657600" indent="0" algn="ctr">
-              <a:buNone/>
-              <a:defRPr sz="1600"/>
-            </a:lvl9pPr>
           </a:lstStyle>
           <a:p>
-            <a:r>
-              <a:rPr lang="en-US"/>
+            <a:pPr lvl="0"/>
+            <a:r>
+              <a:rPr lang="en-US" altLang="zh-CN" noProof="0" smtClean="0"/>
               <a:t>Click to edit Master subtitle style</a:t>
             </a:r>
-            <a:endParaRPr lang="en-US"/>
+            <a:endParaRPr lang="en-US" altLang="zh-CN" noProof="0" smtClean="0"/>
           </a:p>
         </p:txBody>
       </p:sp>
       <p:sp>
         <p:nvSpPr>
-          <p:cNvPr id="4" name="Date Placeholder 3"/>
+          <p:cNvPr id="9" name="Rectangle 5"/>
           <p:cNvSpPr>
-            <a:spLocks noGrp="1"/>
+            <a:spLocks noGrp="1" noChangeArrowheads="1"/>
           </p:cNvSpPr>
           <p:nvPr>
-            <p:ph type="dt" sz="half" idx="10"/>
+            <p:ph type="dt" sz="half" idx="2"/>
           </p:nvPr>
         </p:nvSpPr>
-        <p:spPr/>
+        <p:spPr bwMode="auto">
+          <a:xfrm>
+            <a:off x="609600" y="6245225"/>
+            <a:ext cx="2844800" cy="476250"/>
+          </a:xfrm>
+          <a:prstGeom prst="rect">
+            <a:avLst/>
+          </a:prstGeom>
+          <a:noFill/>
+          <a:extLst>
+            <a:ext uri="{909E8E84-426E-40DD-AFC4-6F175D3DCCD1}">
+              <a14:hiddenFill xmlns:a14="http://schemas.microsoft.com/office/drawing/2010/main">
+                <a:solidFill>
+                  <a:schemeClr val="accent1"/>
+                </a:solidFill>
+              </a14:hiddenFill>
+            </a:ext>
+            <a:ext uri="{91240B29-F687-4F45-9708-019B960494DF}">
+              <a14:hiddenLine xmlns:a14="http://schemas.microsoft.com/office/drawing/2010/main" w="9525">
+                <a:solidFill>
+                  <a:srgbClr val="000000"/>
+                </a:solidFill>
+                <a:miter lim="800000"/>
+                <a:headEnd/>
+                <a:tailEnd/>
+              </a14:hiddenLine>
+            </a:ext>
+            <a:ext uri="{AF507438-7753-43E0-B8FC-AC1667EBCBE1}">
+              <a14:hiddenEffects xmlns:a14="http://schemas.microsoft.com/office/drawing/2010/main">
+                <a:effectLst>
+                  <a:outerShdw dist="35921" dir="2700000" algn="ctr" rotWithShape="0">
+                    <a:schemeClr val="bg2"/>
+                  </a:outerShdw>
+                </a:effectLst>
+              </a14:hiddenEffects>
+            </a:ext>
+          </a:extLst>
+        </p:spPr>
         <p:txBody>
-          <a:bodyPr/>
-          <a:lstStyle/>
+          <a:bodyPr vert="horz" wrap="square" lIns="91440" tIns="45720" rIns="91440" bIns="45720" numCol="1" anchor="t" anchorCtr="0" compatLnSpc="1"/>
+          <a:lstStyle>
+            <a:lvl1pPr>
+              <a:defRPr/>
+            </a:lvl1pPr>
+          </a:lstStyle>
           <a:p>
             <a:fld id="{C944E1D5-9E5A-4C01-9136-05C78765746C}" type="datetimeFigureOut">
               <a:rPr lang="en-US" smtClean="0"/>
@@ -1542,18 +1590,59 @@
       </p:sp>
       <p:sp>
         <p:nvSpPr>
-          <p:cNvPr id="5" name="Footer Placeholder 4"/>
+          <p:cNvPr id="10" name="Rectangle 6"/>
           <p:cNvSpPr>
-            <a:spLocks noGrp="1"/>
+            <a:spLocks noGrp="1" noChangeArrowheads="1"/>
           </p:cNvSpPr>
           <p:nvPr>
-            <p:ph type="ftr" sz="quarter" idx="11"/>
+            <p:ph type="ftr" sz="quarter" idx="3"/>
           </p:nvPr>
         </p:nvSpPr>
-        <p:spPr/>
+        <p:spPr bwMode="auto">
+          <a:xfrm>
+            <a:off x="4165600" y="6245225"/>
+            <a:ext cx="3860800" cy="476250"/>
+          </a:xfrm>
+          <a:prstGeom prst="rect">
+            <a:avLst/>
+          </a:prstGeom>
+          <a:noFill/>
+          <a:extLst>
+            <a:ext uri="{909E8E84-426E-40DD-AFC4-6F175D3DCCD1}">
+              <a14:hiddenFill xmlns:a14="http://schemas.microsoft.com/office/drawing/2010/main">
+                <a:solidFill>
+                  <a:schemeClr val="accent1"/>
+                </a:solidFill>
+              </a14:hiddenFill>
+            </a:ext>
+            <a:ext uri="{91240B29-F687-4F45-9708-019B960494DF}">
+              <a14:hiddenLine xmlns:a14="http://schemas.microsoft.com/office/drawing/2010/main" w="9525">
+                <a:solidFill>
+                  <a:srgbClr val="000000"/>
+                </a:solidFill>
+                <a:miter lim="800000"/>
+                <a:headEnd/>
+                <a:tailEnd/>
+              </a14:hiddenLine>
+            </a:ext>
+            <a:ext uri="{AF507438-7753-43E0-B8FC-AC1667EBCBE1}">
+              <a14:hiddenEffects xmlns:a14="http://schemas.microsoft.com/office/drawing/2010/main">
+                <a:effectLst>
+                  <a:outerShdw dist="35921" dir="2700000" algn="ctr" rotWithShape="0">
+                    <a:schemeClr val="bg2"/>
+                  </a:outerShdw>
+                </a:effectLst>
+              </a14:hiddenEffects>
+            </a:ext>
+          </a:extLst>
+        </p:spPr>
         <p:txBody>
-          <a:bodyPr/>
-          <a:lstStyle/>
+          <a:bodyPr vert="horz" wrap="square" lIns="91440" tIns="45720" rIns="91440" bIns="45720" numCol="1" anchor="t" anchorCtr="0" compatLnSpc="1"/>
+          <a:lstStyle>
+            <a:lvl1pPr>
+              <a:defRPr/>
+            </a:lvl1pPr>
+          </a:lstStyle>
           <a:p>
             <a:endParaRPr lang="en-US"/>
           </a:p>
@@ -1561,18 +1650,59 @@
       </p:sp>
       <p:sp>
         <p:nvSpPr>
-          <p:cNvPr id="6" name="Slide Number Placeholder 5"/>
+          <p:cNvPr id="11" name="Rectangle 7"/>
           <p:cNvSpPr>
-            <a:spLocks noGrp="1"/>
+            <a:spLocks noGrp="1" noChangeArrowheads="1"/>
           </p:cNvSpPr>
           <p:nvPr>
-            <p:ph type="sldNum" sz="quarter" idx="12"/>
+            <p:ph type="sldNum" sz="quarter" idx="4"/>
           </p:nvPr>
         </p:nvSpPr>
-        <p:spPr/>
+        <p:spPr bwMode="auto">
+          <a:xfrm>
+            <a:off x="8737600" y="6245225"/>
+            <a:ext cx="2844800" cy="476250"/>
+          </a:xfrm>
+          <a:prstGeom prst="rect">
+            <a:avLst/>
+          </a:prstGeom>
+          <a:noFill/>
+          <a:extLst>
+            <a:ext uri="{909E8E84-426E-40DD-AFC4-6F175D3DCCD1}">
+              <a14:hiddenFill xmlns:a14="http://schemas.microsoft.com/office/drawing/2010/main">
+                <a:solidFill>
+                  <a:schemeClr val="accent1"/>
+                </a:solidFill>
+              </a14:hiddenFill>
+            </a:ext>
+            <a:ext uri="{91240B29-F687-4F45-9708-019B960494DF}">
+              <a14:hiddenLine xmlns:a14="http://schemas.microsoft.com/office/drawing/2010/main" w="9525">
+                <a:solidFill>
+                  <a:srgbClr val="000000"/>
+                </a:solidFill>
+                <a:miter lim="800000"/>
+                <a:headEnd/>
+                <a:tailEnd/>
+              </a14:hiddenLine>
+            </a:ext>
+            <a:ext uri="{AF507438-7753-43E0-B8FC-AC1667EBCBE1}">
+              <a14:hiddenEffects xmlns:a14="http://schemas.microsoft.com/office/drawing/2010/main">
+                <a:effectLst>
+                  <a:outerShdw dist="35921" dir="2700000" algn="ctr" rotWithShape="0">
+                    <a:schemeClr val="bg2"/>
+                  </a:outerShdw>
+                </a:effectLst>
+              </a14:hiddenEffects>
+            </a:ext>
+          </a:extLst>
+        </p:spPr>
         <p:txBody>
-          <a:bodyPr/>
-          <a:lstStyle/>
+          <a:bodyPr vert="horz" wrap="square" lIns="91440" tIns="45720" rIns="91440" bIns="45720" numCol="1" anchor="t" anchorCtr="0" compatLnSpc="1"/>
+          <a:lstStyle>
+            <a:lvl1pPr>
+              <a:defRPr/>
+            </a:lvl1pPr>
+          </a:lstStyle>
           <a:p>
             <a:fld id="{69D6A1C1-99AF-4131-B133-315FDD2B84F7}" type="slidenum">
               <a:rPr lang="en-US" smtClean="0"/>
@@ -1586,6 +1716,7 @@
   <p:clrMapOvr>
     <a:masterClrMapping/>
   </p:clrMapOvr>
+  <p:hf sldNum="0" hdr="0" ftr="0" dt="0"/>
 </p:sldLayout>
 </file>
 
@@ -1622,7 +1753,7 @@
           <a:lstStyle/>
           <a:p>
             <a:r>
-              <a:rPr lang="en-US"/>
+              <a:rPr lang="en-US" smtClean="0"/>
               <a:t>Click to edit Master title style</a:t>
             </a:r>
             <a:endParaRPr lang="en-US"/>
@@ -1646,39 +1777,39 @@
           <a:p>
             <a:pPr lvl="0"/>
             <a:r>
-              <a:rPr lang="en-US"/>
+              <a:rPr lang="en-US" smtClean="0"/>
               <a:t>Click to edit Master text styles</a:t>
             </a:r>
-            <a:endParaRPr lang="en-US"/>
+            <a:endParaRPr lang="en-US" smtClean="0"/>
           </a:p>
           <a:p>
             <a:pPr lvl="1"/>
             <a:r>
-              <a:rPr lang="en-US"/>
+              <a:rPr lang="en-US" smtClean="0"/>
               <a:t>Second level</a:t>
             </a:r>
-            <a:endParaRPr lang="en-US"/>
+            <a:endParaRPr lang="en-US" smtClean="0"/>
           </a:p>
           <a:p>
             <a:pPr lvl="2"/>
             <a:r>
-              <a:rPr lang="en-US"/>
+              <a:rPr lang="en-US" smtClean="0"/>
               <a:t>Third level</a:t>
             </a:r>
-            <a:endParaRPr lang="en-US"/>
+            <a:endParaRPr lang="en-US" smtClean="0"/>
           </a:p>
           <a:p>
             <a:pPr lvl="3"/>
             <a:r>
-              <a:rPr lang="en-US"/>
+              <a:rPr lang="en-US" smtClean="0"/>
               <a:t>Fourth level</a:t>
             </a:r>
-            <a:endParaRPr lang="en-US"/>
+            <a:endParaRPr lang="en-US" smtClean="0"/>
           </a:p>
           <a:p>
             <a:pPr lvl="4"/>
             <a:r>
-              <a:rPr lang="en-US"/>
+              <a:rPr lang="en-US" smtClean="0"/>
               <a:t>Fifth level</a:t>
             </a:r>
             <a:endParaRPr lang="en-US"/>
@@ -1698,7 +1829,6 @@
         <p:spPr/>
         <p:txBody>
           <a:bodyPr/>
-          <a:lstStyle/>
           <a:p>
             <a:fld id="{C944E1D5-9E5A-4C01-9136-05C78765746C}" type="datetimeFigureOut">
               <a:rPr lang="en-US" smtClean="0"/>
@@ -1720,7 +1850,6 @@
         <p:spPr/>
         <p:txBody>
           <a:bodyPr/>
-          <a:lstStyle/>
           <a:p>
             <a:endParaRPr lang="en-US"/>
           </a:p>
@@ -1739,7 +1868,6 @@
         <p:spPr/>
         <p:txBody>
           <a:bodyPr/>
-          <a:lstStyle/>
           <a:p>
             <a:fld id="{69D6A1C1-99AF-4131-B133-315FDD2B84F7}" type="slidenum">
               <a:rPr lang="en-US" smtClean="0"/>
@@ -1753,6 +1881,7 @@
   <p:clrMapOvr>
     <a:masterClrMapping/>
   </p:clrMapOvr>
+  <p:hf sldNum="0" hdr="0" ftr="0" dt="0"/>
 </p:sldLayout>
 </file>
 
@@ -1785,8 +1914,8 @@
         </p:nvSpPr>
         <p:spPr>
           <a:xfrm>
-            <a:off x="8724900" y="365125"/>
-            <a:ext cx="2628900" cy="5811838"/>
+            <a:off x="8839200" y="190500"/>
+            <a:ext cx="2743200" cy="5937250"/>
           </a:xfrm>
         </p:spPr>
         <p:txBody>
@@ -1794,7 +1923,7 @@
           <a:lstStyle/>
           <a:p>
             <a:r>
-              <a:rPr lang="en-US"/>
+              <a:rPr lang="en-US" smtClean="0"/>
               <a:t>Click to edit Master title style</a:t>
             </a:r>
             <a:endParaRPr lang="en-US"/>
@@ -1813,8 +1942,8 @@
         </p:nvSpPr>
         <p:spPr>
           <a:xfrm>
-            <a:off x="838200" y="365125"/>
-            <a:ext cx="7734300" cy="5811838"/>
+            <a:off x="609600" y="190500"/>
+            <a:ext cx="8026400" cy="5937250"/>
           </a:xfrm>
         </p:spPr>
         <p:txBody>
@@ -1823,39 +1952,39 @@
           <a:p>
             <a:pPr lvl="0"/>
             <a:r>
-              <a:rPr lang="en-US"/>
+              <a:rPr lang="en-US" smtClean="0"/>
               <a:t>Click to edit Master text styles</a:t>
             </a:r>
-            <a:endParaRPr lang="en-US"/>
+            <a:endParaRPr lang="en-US" smtClean="0"/>
           </a:p>
           <a:p>
             <a:pPr lvl="1"/>
             <a:r>
-              <a:rPr lang="en-US"/>
+              <a:rPr lang="en-US" smtClean="0"/>
               <a:t>Second level</a:t>
             </a:r>
-            <a:endParaRPr lang="en-US"/>
+            <a:endParaRPr lang="en-US" smtClean="0"/>
           </a:p>
           <a:p>
             <a:pPr lvl="2"/>
             <a:r>
-              <a:rPr lang="en-US"/>
+              <a:rPr lang="en-US" smtClean="0"/>
               <a:t>Third level</a:t>
             </a:r>
-            <a:endParaRPr lang="en-US"/>
+            <a:endParaRPr lang="en-US" smtClean="0"/>
           </a:p>
           <a:p>
             <a:pPr lvl="3"/>
             <a:r>
-              <a:rPr lang="en-US"/>
+              <a:rPr lang="en-US" smtClean="0"/>
               <a:t>Fourth level</a:t>
             </a:r>
-            <a:endParaRPr lang="en-US"/>
+            <a:endParaRPr lang="en-US" smtClean="0"/>
           </a:p>
           <a:p>
             <a:pPr lvl="4"/>
             <a:r>
-              <a:rPr lang="en-US"/>
+              <a:rPr lang="en-US" smtClean="0"/>
               <a:t>Fifth level</a:t>
             </a:r>
             <a:endParaRPr lang="en-US"/>
@@ -1875,7 +2004,6 @@
         <p:spPr/>
         <p:txBody>
           <a:bodyPr/>
-          <a:lstStyle/>
           <a:p>
             <a:fld id="{C944E1D5-9E5A-4C01-9136-05C78765746C}" type="datetimeFigureOut">
               <a:rPr lang="en-US" smtClean="0"/>
@@ -1897,7 +2025,6 @@
         <p:spPr/>
         <p:txBody>
           <a:bodyPr/>
-          <a:lstStyle/>
           <a:p>
             <a:endParaRPr lang="en-US"/>
           </a:p>
@@ -1916,7 +2043,6 @@
         <p:spPr/>
         <p:txBody>
           <a:bodyPr/>
-          <a:lstStyle/>
           <a:p>
             <a:fld id="{69D6A1C1-99AF-4131-B133-315FDD2B84F7}" type="slidenum">
               <a:rPr lang="en-US" smtClean="0"/>
@@ -1930,6 +2056,7 @@
   <p:clrMapOvr>
     <a:masterClrMapping/>
   </p:clrMapOvr>
+  <p:hf sldNum="0" hdr="0" ftr="0" dt="0"/>
 </p:sldLayout>
 </file>
 
@@ -1966,7 +2093,7 @@
           <a:lstStyle/>
           <a:p>
             <a:r>
-              <a:rPr lang="en-US"/>
+              <a:rPr lang="en-US" smtClean="0"/>
               <a:t>Click to edit Master title style</a:t>
             </a:r>
             <a:endParaRPr lang="en-US"/>
@@ -1990,39 +2117,39 @@
           <a:p>
             <a:pPr lvl="0"/>
             <a:r>
-              <a:rPr lang="en-US"/>
+              <a:rPr lang="en-US" smtClean="0"/>
               <a:t>Click to edit Master text styles</a:t>
             </a:r>
-            <a:endParaRPr lang="en-US"/>
+            <a:endParaRPr lang="en-US" smtClean="0"/>
           </a:p>
           <a:p>
             <a:pPr lvl="1"/>
             <a:r>
-              <a:rPr lang="en-US"/>
+              <a:rPr lang="en-US" smtClean="0"/>
               <a:t>Second level</a:t>
             </a:r>
-            <a:endParaRPr lang="en-US"/>
+            <a:endParaRPr lang="en-US" smtClean="0"/>
           </a:p>
           <a:p>
             <a:pPr lvl="2"/>
             <a:r>
-              <a:rPr lang="en-US"/>
+              <a:rPr lang="en-US" smtClean="0"/>
               <a:t>Third level</a:t>
             </a:r>
-            <a:endParaRPr lang="en-US"/>
+            <a:endParaRPr lang="en-US" smtClean="0"/>
           </a:p>
           <a:p>
             <a:pPr lvl="3"/>
             <a:r>
-              <a:rPr lang="en-US"/>
+              <a:rPr lang="en-US" smtClean="0"/>
               <a:t>Fourth level</a:t>
             </a:r>
-            <a:endParaRPr lang="en-US"/>
+            <a:endParaRPr lang="en-US" smtClean="0"/>
           </a:p>
           <a:p>
             <a:pPr lvl="4"/>
             <a:r>
-              <a:rPr lang="en-US"/>
+              <a:rPr lang="en-US" smtClean="0"/>
               <a:t>Fifth level</a:t>
             </a:r>
             <a:endParaRPr lang="en-US"/>
@@ -2042,7 +2169,6 @@
         <p:spPr/>
         <p:txBody>
           <a:bodyPr/>
-          <a:lstStyle/>
           <a:p>
             <a:fld id="{C944E1D5-9E5A-4C01-9136-05C78765746C}" type="datetimeFigureOut">
               <a:rPr lang="en-US" smtClean="0"/>
@@ -2064,7 +2190,6 @@
         <p:spPr/>
         <p:txBody>
           <a:bodyPr/>
-          <a:lstStyle/>
           <a:p>
             <a:endParaRPr lang="en-US"/>
           </a:p>
@@ -2083,7 +2208,6 @@
         <p:spPr/>
         <p:txBody>
           <a:bodyPr/>
-          <a:lstStyle/>
           <a:p>
             <a:fld id="{69D6A1C1-99AF-4131-B133-315FDD2B84F7}" type="slidenum">
               <a:rPr lang="en-US" smtClean="0"/>
@@ -2097,6 +2221,7 @@
   <p:clrMapOvr>
     <a:masterClrMapping/>
   </p:clrMapOvr>
+  <p:hf sldNum="0" hdr="0" ftr="0" dt="0"/>
 </p:sldLayout>
 </file>
 
@@ -2129,7 +2254,7 @@
         </p:nvSpPr>
         <p:spPr>
           <a:xfrm>
-            <a:off x="831850" y="1709738"/>
+            <a:off x="831851" y="1709738"/>
             <a:ext cx="10515600" cy="2852737"/>
           </a:xfrm>
         </p:spPr>
@@ -2142,7 +2267,7 @@
           </a:lstStyle>
           <a:p>
             <a:r>
-              <a:rPr lang="en-US"/>
+              <a:rPr lang="en-US" smtClean="0"/>
               <a:t>Click to edit Master title style</a:t>
             </a:r>
             <a:endParaRPr lang="en-US"/>
@@ -2161,7 +2286,7 @@
         </p:nvSpPr>
         <p:spPr>
           <a:xfrm>
-            <a:off x="831850" y="4589463"/>
+            <a:off x="831851" y="4589463"/>
             <a:ext cx="10515600" cy="1500187"/>
           </a:xfrm>
         </p:spPr>
@@ -2170,102 +2295,48 @@
           <a:lstStyle>
             <a:lvl1pPr marL="0" indent="0">
               <a:buNone/>
-              <a:defRPr sz="2400">
-                <a:solidFill>
-                  <a:schemeClr val="tx1">
-                    <a:tint val="82000"/>
-                  </a:schemeClr>
-                </a:solidFill>
-              </a:defRPr>
+              <a:defRPr sz="2400"/>
             </a:lvl1pPr>
             <a:lvl2pPr marL="457200" indent="0">
               <a:buNone/>
-              <a:defRPr sz="2000">
-                <a:solidFill>
-                  <a:schemeClr val="tx1">
-                    <a:tint val="82000"/>
-                  </a:schemeClr>
-                </a:solidFill>
-              </a:defRPr>
+              <a:defRPr sz="2000"/>
             </a:lvl2pPr>
             <a:lvl3pPr marL="914400" indent="0">
               <a:buNone/>
-              <a:defRPr sz="1800">
-                <a:solidFill>
-                  <a:schemeClr val="tx1">
-                    <a:tint val="82000"/>
-                  </a:schemeClr>
-                </a:solidFill>
-              </a:defRPr>
+              <a:defRPr sz="1800"/>
             </a:lvl3pPr>
             <a:lvl4pPr marL="1371600" indent="0">
               <a:buNone/>
-              <a:defRPr sz="1600">
-                <a:solidFill>
-                  <a:schemeClr val="tx1">
-                    <a:tint val="82000"/>
-                  </a:schemeClr>
-                </a:solidFill>
-              </a:defRPr>
+              <a:defRPr sz="1600"/>
             </a:lvl4pPr>
             <a:lvl5pPr marL="1828800" indent="0">
               <a:buNone/>
-              <a:defRPr sz="1600">
-                <a:solidFill>
-                  <a:schemeClr val="tx1">
-                    <a:tint val="82000"/>
-                  </a:schemeClr>
-                </a:solidFill>
-              </a:defRPr>
+              <a:defRPr sz="1600"/>
             </a:lvl5pPr>
             <a:lvl6pPr marL="2286000" indent="0">
               <a:buNone/>
-              <a:defRPr sz="1600">
-                <a:solidFill>
-                  <a:schemeClr val="tx1">
-                    <a:tint val="82000"/>
-                  </a:schemeClr>
-                </a:solidFill>
-              </a:defRPr>
+              <a:defRPr sz="1600"/>
             </a:lvl6pPr>
             <a:lvl7pPr marL="2743200" indent="0">
               <a:buNone/>
-              <a:defRPr sz="1600">
-                <a:solidFill>
-                  <a:schemeClr val="tx1">
-                    <a:tint val="82000"/>
-                  </a:schemeClr>
-                </a:solidFill>
-              </a:defRPr>
+              <a:defRPr sz="1600"/>
             </a:lvl7pPr>
             <a:lvl8pPr marL="3200400" indent="0">
               <a:buNone/>
-              <a:defRPr sz="1600">
-                <a:solidFill>
-                  <a:schemeClr val="tx1">
-                    <a:tint val="82000"/>
-                  </a:schemeClr>
-                </a:solidFill>
-              </a:defRPr>
+              <a:defRPr sz="1600"/>
             </a:lvl8pPr>
             <a:lvl9pPr marL="3657600" indent="0">
               <a:buNone/>
-              <a:defRPr sz="1600">
-                <a:solidFill>
-                  <a:schemeClr val="tx1">
-                    <a:tint val="82000"/>
-                  </a:schemeClr>
-                </a:solidFill>
-              </a:defRPr>
+              <a:defRPr sz="1600"/>
             </a:lvl9pPr>
           </a:lstStyle>
           <a:p>
             <a:pPr lvl="0"/>
             <a:r>
-              <a:rPr lang="en-US"/>
+              <a:rPr lang="en-US" smtClean="0"/>
               <a:t>Click to edit Master text styles</a:t>
             </a:r>
-            <a:endParaRPr lang="en-US"/>
+            <a:endParaRPr lang="en-US" smtClean="0"/>
           </a:p>
         </p:txBody>
       </p:sp>
@@ -2282,7 +2353,6 @@
         <p:spPr/>
         <p:txBody>
           <a:bodyPr/>
-          <a:lstStyle/>
           <a:p>
             <a:fld id="{C944E1D5-9E5A-4C01-9136-05C78765746C}" type="datetimeFigureOut">
               <a:rPr lang="en-US" smtClean="0"/>
@@ -2304,7 +2374,6 @@
         <p:spPr/>
         <p:txBody>
           <a:bodyPr/>
-          <a:lstStyle/>
           <a:p>
             <a:endParaRPr lang="en-US"/>
           </a:p>
@@ -2323,7 +2392,6 @@
         <p:spPr/>
         <p:txBody>
           <a:bodyPr/>
-          <a:lstStyle/>
           <a:p>
             <a:fld id="{69D6A1C1-99AF-4131-B133-315FDD2B84F7}" type="slidenum">
               <a:rPr lang="en-US" smtClean="0"/>
@@ -2337,6 +2405,7 @@
   <p:clrMapOvr>
     <a:masterClrMapping/>
   </p:clrMapOvr>
+  <p:hf sldNum="0" hdr="0" ftr="0" dt="0"/>
 </p:sldLayout>
 </file>
 
@@ -2373,7 +2442,7 @@
           <a:lstStyle/>
           <a:p>
             <a:r>
-              <a:rPr lang="en-US"/>
+              <a:rPr lang="en-US" smtClean="0"/>
               <a:t>Click to edit Master title style</a:t>
             </a:r>
             <a:endParaRPr lang="en-US"/>
@@ -2392,8 +2461,8 @@
         </p:nvSpPr>
         <p:spPr>
           <a:xfrm>
-            <a:off x="838200" y="1825625"/>
-            <a:ext cx="5181600" cy="4351338"/>
+            <a:off x="609600" y="1174750"/>
+            <a:ext cx="5384800" cy="4953000"/>
           </a:xfrm>
         </p:spPr>
         <p:txBody>
@@ -2402,39 +2471,39 @@
           <a:p>
             <a:pPr lvl="0"/>
             <a:r>
-              <a:rPr lang="en-US"/>
+              <a:rPr lang="en-US" smtClean="0"/>
               <a:t>Click to edit Master text styles</a:t>
             </a:r>
-            <a:endParaRPr lang="en-US"/>
+            <a:endParaRPr lang="en-US" smtClean="0"/>
           </a:p>
           <a:p>
             <a:pPr lvl="1"/>
             <a:r>
-              <a:rPr lang="en-US"/>
+              <a:rPr lang="en-US" smtClean="0"/>
               <a:t>Second level</a:t>
             </a:r>
-            <a:endParaRPr lang="en-US"/>
+            <a:endParaRPr lang="en-US" smtClean="0"/>
           </a:p>
           <a:p>
             <a:pPr lvl="2"/>
             <a:r>
-              <a:rPr lang="en-US"/>
+              <a:rPr lang="en-US" smtClean="0"/>
               <a:t>Third level</a:t>
             </a:r>
-            <a:endParaRPr lang="en-US"/>
+            <a:endParaRPr lang="en-US" smtClean="0"/>
           </a:p>
           <a:p>
             <a:pPr lvl="3"/>
             <a:r>
-              <a:rPr lang="en-US"/>
+              <a:rPr lang="en-US" smtClean="0"/>
               <a:t>Fourth level</a:t>
             </a:r>
-            <a:endParaRPr lang="en-US"/>
+            <a:endParaRPr lang="en-US" smtClean="0"/>
           </a:p>
           <a:p>
             <a:pPr lvl="4"/>
             <a:r>
-              <a:rPr lang="en-US"/>
+              <a:rPr lang="en-US" smtClean="0"/>
               <a:t>Fifth level</a:t>
             </a:r>
             <a:endParaRPr lang="en-US"/>
@@ -2453,8 +2522,8 @@
         </p:nvSpPr>
         <p:spPr>
           <a:xfrm>
-            <a:off x="6172200" y="1825625"/>
-            <a:ext cx="5181600" cy="4351338"/>
+            <a:off x="6197600" y="1174750"/>
+            <a:ext cx="5384800" cy="4953000"/>
           </a:xfrm>
         </p:spPr>
         <p:txBody>
@@ -2463,39 +2532,39 @@
           <a:p>
             <a:pPr lvl="0"/>
             <a:r>
-              <a:rPr lang="en-US"/>
+              <a:rPr lang="en-US" smtClean="0"/>
               <a:t>Click to edit Master text styles</a:t>
             </a:r>
-            <a:endParaRPr lang="en-US"/>
+            <a:endParaRPr lang="en-US" smtClean="0"/>
           </a:p>
           <a:p>
             <a:pPr lvl="1"/>
             <a:r>
-              <a:rPr lang="en-US"/>
+              <a:rPr lang="en-US" smtClean="0"/>
               <a:t>Second level</a:t>
             </a:r>
-            <a:endParaRPr lang="en-US"/>
+            <a:endParaRPr lang="en-US" smtClean="0"/>
           </a:p>
           <a:p>
             <a:pPr lvl="2"/>
             <a:r>
-              <a:rPr lang="en-US"/>
+              <a:rPr lang="en-US" smtClean="0"/>
               <a:t>Third level</a:t>
             </a:r>
-            <a:endParaRPr lang="en-US"/>
+            <a:endParaRPr lang="en-US" smtClean="0"/>
           </a:p>
           <a:p>
             <a:pPr lvl="3"/>
             <a:r>
-              <a:rPr lang="en-US"/>
+              <a:rPr lang="en-US" smtClean="0"/>
               <a:t>Fourth level</a:t>
             </a:r>
-            <a:endParaRPr lang="en-US"/>
+            <a:endParaRPr lang="en-US" smtClean="0"/>
           </a:p>
           <a:p>
             <a:pPr lvl="4"/>
             <a:r>
-              <a:rPr lang="en-US"/>
+              <a:rPr lang="en-US" smtClean="0"/>
               <a:t>Fifth level</a:t>
             </a:r>
             <a:endParaRPr lang="en-US"/>
@@ -2515,7 +2584,6 @@
         <p:spPr/>
         <p:txBody>
           <a:bodyPr/>
-          <a:lstStyle/>
           <a:p>
             <a:fld id="{C944E1D5-9E5A-4C01-9136-05C78765746C}" type="datetimeFigureOut">
               <a:rPr lang="en-US" smtClean="0"/>
@@ -2537,7 +2605,6 @@
         <p:spPr/>
         <p:txBody>
           <a:bodyPr/>
-          <a:lstStyle/>
           <a:p>
             <a:endParaRPr lang="en-US"/>
           </a:p>
@@ -2556,7 +2623,6 @@
         <p:spPr/>
         <p:txBody>
           <a:bodyPr/>
-          <a:lstStyle/>
           <a:p>
             <a:fld id="{69D6A1C1-99AF-4131-B133-315FDD2B84F7}" type="slidenum">
               <a:rPr lang="en-US" smtClean="0"/>
@@ -2570,6 +2636,7 @@
   <p:clrMapOvr>
     <a:masterClrMapping/>
   </p:clrMapOvr>
+  <p:hf sldNum="0" hdr="0" ftr="0" dt="0"/>
 </p:sldLayout>
 </file>
 
@@ -2602,7 +2669,7 @@
         </p:nvSpPr>
         <p:spPr>
           <a:xfrm>
-            <a:off x="839788" y="365125"/>
+            <a:off x="840317" y="365125"/>
             <a:ext cx="10515600" cy="1325563"/>
           </a:xfrm>
         </p:spPr>
@@ -2611,7 +2678,7 @@
           <a:lstStyle/>
           <a:p>
             <a:r>
-              <a:rPr lang="en-US"/>
+              <a:rPr lang="en-US" smtClean="0"/>
               <a:t>Click to edit Master title style</a:t>
             </a:r>
             <a:endParaRPr lang="en-US"/>
@@ -2630,8 +2697,8 @@
         </p:nvSpPr>
         <p:spPr>
           <a:xfrm>
-            <a:off x="839788" y="1681163"/>
-            <a:ext cx="5157787" cy="823912"/>
+            <a:off x="840317" y="1681163"/>
+            <a:ext cx="5158316" cy="823912"/>
           </a:xfrm>
         </p:spPr>
         <p:txBody>
@@ -2677,10 +2744,10 @@
           <a:p>
             <a:pPr lvl="0"/>
             <a:r>
-              <a:rPr lang="en-US"/>
+              <a:rPr lang="en-US" smtClean="0"/>
               <a:t>Click to edit Master text styles</a:t>
             </a:r>
-            <a:endParaRPr lang="en-US"/>
+            <a:endParaRPr lang="en-US" smtClean="0"/>
           </a:p>
         </p:txBody>
       </p:sp>
@@ -2696,8 +2763,8 @@
         </p:nvSpPr>
         <p:spPr>
           <a:xfrm>
-            <a:off x="839788" y="2505075"/>
-            <a:ext cx="5157787" cy="3684588"/>
+            <a:off x="840317" y="2505075"/>
+            <a:ext cx="5158316" cy="3684588"/>
           </a:xfrm>
         </p:spPr>
         <p:txBody>
@@ -2706,39 +2773,39 @@
           <a:p>
             <a:pPr lvl="0"/>
             <a:r>
-              <a:rPr lang="en-US"/>
+              <a:rPr lang="en-US" smtClean="0"/>
               <a:t>Click to edit Master text styles</a:t>
             </a:r>
-            <a:endParaRPr lang="en-US"/>
+            <a:endParaRPr lang="en-US" smtClean="0"/>
           </a:p>
           <a:p>
             <a:pPr lvl="1"/>
             <a:r>
-              <a:rPr lang="en-US"/>
+              <a:rPr lang="en-US" smtClean="0"/>
               <a:t>Second level</a:t>
             </a:r>
-            <a:endParaRPr lang="en-US"/>
+            <a:endParaRPr lang="en-US" smtClean="0"/>
           </a:p>
           <a:p>
             <a:pPr lvl="2"/>
             <a:r>
-              <a:rPr lang="en-US"/>
+              <a:rPr lang="en-US" smtClean="0"/>
               <a:t>Third level</a:t>
             </a:r>
-            <a:endParaRPr lang="en-US"/>
+            <a:endParaRPr lang="en-US" smtClean="0"/>
           </a:p>
           <a:p>
             <a:pPr lvl="3"/>
             <a:r>
-              <a:rPr lang="en-US"/>
+              <a:rPr lang="en-US" smtClean="0"/>
               <a:t>Fourth level</a:t>
             </a:r>
-            <a:endParaRPr lang="en-US"/>
+            <a:endParaRPr lang="en-US" smtClean="0"/>
           </a:p>
           <a:p>
             <a:pPr lvl="4"/>
             <a:r>
-              <a:rPr lang="en-US"/>
+              <a:rPr lang="en-US" smtClean="0"/>
               <a:t>Fifth level</a:t>
             </a:r>
             <a:endParaRPr lang="en-US"/>
@@ -2758,7 +2825,7 @@
         <p:spPr>
           <a:xfrm>
             <a:off x="6172200" y="1681163"/>
-            <a:ext cx="5183188" cy="823912"/>
+            <a:ext cx="5183717" cy="823912"/>
           </a:xfrm>
         </p:spPr>
         <p:txBody>
@@ -2804,10 +2871,10 @@
           <a:p>
             <a:pPr lvl="0"/>
             <a:r>
-              <a:rPr lang="en-US"/>
+              <a:rPr lang="en-US" smtClean="0"/>
               <a:t>Click to edit Master text styles</a:t>
             </a:r>
-            <a:endParaRPr lang="en-US"/>
+            <a:endParaRPr lang="en-US" smtClean="0"/>
           </a:p>
         </p:txBody>
       </p:sp>
@@ -2824,7 +2891,7 @@
         <p:spPr>
           <a:xfrm>
             <a:off x="6172200" y="2505075"/>
-            <a:ext cx="5183188" cy="3684588"/>
+            <a:ext cx="5183717" cy="3684588"/>
           </a:xfrm>
         </p:spPr>
         <p:txBody>
@@ -2833,39 +2900,39 @@
           <a:p>
             <a:pPr lvl="0"/>
             <a:r>
-              <a:rPr lang="en-US"/>
+              <a:rPr lang="en-US" smtClean="0"/>
               <a:t>Click to edit Master text styles</a:t>
             </a:r>
-            <a:endParaRPr lang="en-US"/>
+            <a:endParaRPr lang="en-US" smtClean="0"/>
           </a:p>
           <a:p>
             <a:pPr lvl="1"/>
             <a:r>
-              <a:rPr lang="en-US"/>
+              <a:rPr lang="en-US" smtClean="0"/>
               <a:t>Second level</a:t>
             </a:r>
-            <a:endParaRPr lang="en-US"/>
+            <a:endParaRPr lang="en-US" smtClean="0"/>
           </a:p>
           <a:p>
             <a:pPr lvl="2"/>
             <a:r>
-              <a:rPr lang="en-US"/>
+              <a:rPr lang="en-US" smtClean="0"/>
               <a:t>Third level</a:t>
             </a:r>
-            <a:endParaRPr lang="en-US"/>
+            <a:endParaRPr lang="en-US" smtClean="0"/>
           </a:p>
           <a:p>
             <a:pPr lvl="3"/>
             <a:r>
-              <a:rPr lang="en-US"/>
+              <a:rPr lang="en-US" smtClean="0"/>
               <a:t>Fourth level</a:t>
             </a:r>
-            <a:endParaRPr lang="en-US"/>
+            <a:endParaRPr lang="en-US" smtClean="0"/>
           </a:p>
           <a:p>
             <a:pPr lvl="4"/>
             <a:r>
-              <a:rPr lang="en-US"/>
+              <a:rPr lang="en-US" smtClean="0"/>
               <a:t>Fifth level</a:t>
             </a:r>
             <a:endParaRPr lang="en-US"/>
@@ -2885,7 +2952,6 @@
         <p:spPr/>
         <p:txBody>
           <a:bodyPr/>
-          <a:lstStyle/>
           <a:p>
             <a:fld id="{C944E1D5-9E5A-4C01-9136-05C78765746C}" type="datetimeFigureOut">
               <a:rPr lang="en-US" smtClean="0"/>
@@ -2907,7 +2973,6 @@
         <p:spPr/>
         <p:txBody>
           <a:bodyPr/>
-          <a:lstStyle/>
           <a:p>
             <a:endParaRPr lang="en-US"/>
           </a:p>
@@ -2926,7 +2991,6 @@
         <p:spPr/>
         <p:txBody>
           <a:bodyPr/>
-          <a:lstStyle/>
           <a:p>
             <a:fld id="{69D6A1C1-99AF-4131-B133-315FDD2B84F7}" type="slidenum">
               <a:rPr lang="en-US" smtClean="0"/>
@@ -2940,6 +3004,7 @@
   <p:clrMapOvr>
     <a:masterClrMapping/>
   </p:clrMapOvr>
+  <p:hf sldNum="0" hdr="0" ftr="0" dt="0"/>
 </p:sldLayout>
 </file>
 
@@ -2976,7 +3041,7 @@
           <a:lstStyle/>
           <a:p>
             <a:r>
-              <a:rPr lang="en-US"/>
+              <a:rPr lang="en-US" smtClean="0"/>
               <a:t>Click to edit Master title style</a:t>
             </a:r>
             <a:endParaRPr lang="en-US"/>
@@ -2996,7 +3061,6 @@
         <p:spPr/>
         <p:txBody>
           <a:bodyPr/>
-          <a:lstStyle/>
           <a:p>
             <a:fld id="{C944E1D5-9E5A-4C01-9136-05C78765746C}" type="datetimeFigureOut">
               <a:rPr lang="en-US" smtClean="0"/>
@@ -3018,7 +3082,6 @@
         <p:spPr/>
         <p:txBody>
           <a:bodyPr/>
-          <a:lstStyle/>
           <a:p>
             <a:endParaRPr lang="en-US"/>
           </a:p>
@@ -3037,7 +3100,6 @@
         <p:spPr/>
         <p:txBody>
           <a:bodyPr/>
-          <a:lstStyle/>
           <a:p>
             <a:fld id="{69D6A1C1-99AF-4131-B133-315FDD2B84F7}" type="slidenum">
               <a:rPr lang="en-US" smtClean="0"/>
@@ -3051,6 +3113,7 @@
   <p:clrMapOvr>
     <a:masterClrMapping/>
   </p:clrMapOvr>
+  <p:hf sldNum="0" hdr="0" ftr="0" dt="0"/>
 </p:sldLayout>
 </file>
 
@@ -3084,7 +3147,6 @@
         <p:spPr/>
         <p:txBody>
           <a:bodyPr/>
-          <a:lstStyle/>
           <a:p>
             <a:fld id="{C944E1D5-9E5A-4C01-9136-05C78765746C}" type="datetimeFigureOut">
               <a:rPr lang="en-US" smtClean="0"/>
@@ -3106,7 +3168,6 @@
         <p:spPr/>
         <p:txBody>
           <a:bodyPr/>
-          <a:lstStyle/>
           <a:p>
             <a:endParaRPr lang="en-US"/>
           </a:p>
@@ -3125,7 +3186,6 @@
         <p:spPr/>
         <p:txBody>
           <a:bodyPr/>
-          <a:lstStyle/>
           <a:p>
             <a:fld id="{69D6A1C1-99AF-4131-B133-315FDD2B84F7}" type="slidenum">
               <a:rPr lang="en-US" smtClean="0"/>
@@ -3139,6 +3199,7 @@
   <p:clrMapOvr>
     <a:masterClrMapping/>
   </p:clrMapOvr>
+  <p:hf sldNum="0" hdr="0" ftr="0" dt="0"/>
 </p:sldLayout>
 </file>
 
@@ -3171,8 +3232,8 @@
         </p:nvSpPr>
         <p:spPr>
           <a:xfrm>
-            <a:off x="839788" y="457200"/>
-            <a:ext cx="3932237" cy="1600200"/>
+            <a:off x="840317" y="457200"/>
+            <a:ext cx="3932767" cy="1600200"/>
           </a:xfrm>
         </p:spPr>
         <p:txBody>
@@ -3184,7 +3245,7 @@
           </a:lstStyle>
           <a:p>
             <a:r>
-              <a:rPr lang="en-US"/>
+              <a:rPr lang="en-US" smtClean="0"/>
               <a:t>Click to edit Master title style</a:t>
             </a:r>
             <a:endParaRPr lang="en-US"/>
@@ -3203,7 +3264,7 @@
         </p:nvSpPr>
         <p:spPr>
           <a:xfrm>
-            <a:off x="5183188" y="987425"/>
+            <a:off x="5183717" y="987425"/>
             <a:ext cx="6172200" cy="4873625"/>
           </a:xfrm>
         </p:spPr>
@@ -3241,39 +3302,39 @@
           <a:p>
             <a:pPr lvl="0"/>
             <a:r>
-              <a:rPr lang="en-US"/>
+              <a:rPr lang="en-US" smtClean="0"/>
               <a:t>Click to edit Master text styles</a:t>
             </a:r>
-            <a:endParaRPr lang="en-US"/>
+            <a:endParaRPr lang="en-US" smtClean="0"/>
           </a:p>
           <a:p>
             <a:pPr lvl="1"/>
             <a:r>
-              <a:rPr lang="en-US"/>
+              <a:rPr lang="en-US" smtClean="0"/>
               <a:t>Second level</a:t>
             </a:r>
-            <a:endParaRPr lang="en-US"/>
+            <a:endParaRPr lang="en-US" smtClean="0"/>
           </a:p>
           <a:p>
             <a:pPr lvl="2"/>
             <a:r>
-              <a:rPr lang="en-US"/>
+              <a:rPr lang="en-US" smtClean="0"/>
               <a:t>Third level</a:t>
             </a:r>
-            <a:endParaRPr lang="en-US"/>
+            <a:endParaRPr lang="en-US" smtClean="0"/>
           </a:p>
           <a:p>
             <a:pPr lvl="3"/>
             <a:r>
-              <a:rPr lang="en-US"/>
+              <a:rPr lang="en-US" smtClean="0"/>
               <a:t>Fourth level</a:t>
             </a:r>
-            <a:endParaRPr lang="en-US"/>
+            <a:endParaRPr lang="en-US" smtClean="0"/>
           </a:p>
           <a:p>
             <a:pPr lvl="4"/>
             <a:r>
-              <a:rPr lang="en-US"/>
+              <a:rPr lang="en-US" smtClean="0"/>
               <a:t>Fifth level</a:t>
             </a:r>
             <a:endParaRPr lang="en-US"/>
@@ -3292,8 +3353,8 @@
         </p:nvSpPr>
         <p:spPr>
           <a:xfrm>
-            <a:off x="839788" y="2057400"/>
-            <a:ext cx="3932237" cy="3811588"/>
+            <a:off x="840317" y="2057400"/>
+            <a:ext cx="3932767" cy="3811588"/>
           </a:xfrm>
         </p:spPr>
         <p:txBody>
@@ -3339,10 +3400,10 @@
           <a:p>
             <a:pPr lvl="0"/>
             <a:r>
-              <a:rPr lang="en-US"/>
+              <a:rPr lang="en-US" smtClean="0"/>
               <a:t>Click to edit Master text styles</a:t>
             </a:r>
-            <a:endParaRPr lang="en-US"/>
+            <a:endParaRPr lang="en-US" smtClean="0"/>
           </a:p>
         </p:txBody>
       </p:sp>
@@ -3359,7 +3420,6 @@
         <p:spPr/>
         <p:txBody>
           <a:bodyPr/>
-          <a:lstStyle/>
           <a:p>
             <a:fld id="{C944E1D5-9E5A-4C01-9136-05C78765746C}" type="datetimeFigureOut">
               <a:rPr lang="en-US" smtClean="0"/>
@@ -3381,7 +3441,6 @@
         <p:spPr/>
         <p:txBody>
           <a:bodyPr/>
-          <a:lstStyle/>
           <a:p>
             <a:endParaRPr lang="en-US"/>
           </a:p>
@@ -3400,7 +3459,6 @@
         <p:spPr/>
         <p:txBody>
           <a:bodyPr/>
-          <a:lstStyle/>
           <a:p>
             <a:fld id="{69D6A1C1-99AF-4131-B133-315FDD2B84F7}" type="slidenum">
               <a:rPr lang="en-US" smtClean="0"/>
@@ -3414,6 +3472,7 @@
   <p:clrMapOvr>
     <a:masterClrMapping/>
   </p:clrMapOvr>
+  <p:hf sldNum="0" hdr="0" ftr="0" dt="0"/>
 </p:sldLayout>
 </file>
 
@@ -3446,8 +3505,8 @@
         </p:nvSpPr>
         <p:spPr>
           <a:xfrm>
-            <a:off x="839788" y="457200"/>
-            <a:ext cx="3932237" cy="1600200"/>
+            <a:off x="840317" y="457200"/>
+            <a:ext cx="3932767" cy="1600200"/>
           </a:xfrm>
         </p:spPr>
         <p:txBody>
@@ -3459,7 +3518,7 @@
           </a:lstStyle>
           <a:p>
             <a:r>
-              <a:rPr lang="en-US"/>
+              <a:rPr lang="en-US" smtClean="0"/>
               <a:t>Click to edit Master title style</a:t>
             </a:r>
             <a:endParaRPr lang="en-US"/>
@@ -3478,12 +3537,12 @@
         </p:nvSpPr>
         <p:spPr>
           <a:xfrm>
-            <a:off x="5183188" y="987425"/>
+            <a:off x="5183717" y="987425"/>
             <a:ext cx="6172200" cy="4873625"/>
           </a:xfrm>
         </p:spPr>
         <p:txBody>
-          <a:bodyPr/>
+          <a:bodyPr vert="horz" wrap="square" lIns="91440" tIns="45720" rIns="91440" bIns="45720" numCol="1" anchor="t" anchorCtr="0" compatLnSpc="1"/>
           <a:lstStyle>
             <a:lvl1pPr marL="0" indent="0">
               <a:buNone/>
@@ -3523,7 +3582,36 @@
             </a:lvl9pPr>
           </a:lstStyle>
           <a:p>
-            <a:endParaRPr lang="en-US"/>
+            <a:pPr marL="0" marR="0" lvl="0" indent="0" algn="l" defTabSz="914400" rtl="0" eaLnBrk="1" fontAlgn="base" latinLnBrk="0" hangingPunct="1">
+              <a:lnSpc>
+                <a:spcPct val="100000"/>
+              </a:lnSpc>
+              <a:spcBef>
+                <a:spcPct val="20000"/>
+              </a:spcBef>
+              <a:spcAft>
+                <a:spcPct val="0"/>
+              </a:spcAft>
+              <a:buClrTx/>
+              <a:buSzTx/>
+              <a:buFontTx/>
+              <a:buNone/>
+              <a:defRPr/>
+            </a:pPr>
+            <a:endParaRPr kumimoji="0" lang="en-US" sz="3200" b="0" i="0" u="none" strike="noStrike" kern="1200" cap="none" spc="0" normalizeH="0" baseline="0" noProof="0" smtClean="0">
+              <a:ln>
+                <a:noFill/>
+              </a:ln>
+              <a:solidFill>
+                <a:schemeClr val="tx1"/>
+              </a:solidFill>
+              <a:effectLst/>
+              <a:uLnTx/>
+              <a:uFillTx/>
+              <a:latin typeface="+mn-lt"/>
+              <a:ea typeface="+mn-ea"/>
+              <a:cs typeface="+mn-cs"/>
+            </a:endParaRPr>
           </a:p>
         </p:txBody>
       </p:sp>
@@ -3539,8 +3627,8 @@
         </p:nvSpPr>
         <p:spPr>
           <a:xfrm>
-            <a:off x="839788" y="2057400"/>
-            <a:ext cx="3932237" cy="3811588"/>
+            <a:off x="840317" y="2057400"/>
+            <a:ext cx="3932767" cy="3811588"/>
           </a:xfrm>
         </p:spPr>
         <p:txBody>
@@ -3586,10 +3674,10 @@
           <a:p>
             <a:pPr lvl="0"/>
             <a:r>
-              <a:rPr lang="en-US"/>
+              <a:rPr lang="en-US" smtClean="0"/>
               <a:t>Click to edit Master text styles</a:t>
             </a:r>
-            <a:endParaRPr lang="en-US"/>
+            <a:endParaRPr lang="en-US" smtClean="0"/>
           </a:p>
         </p:txBody>
       </p:sp>
@@ -3606,7 +3694,6 @@
         <p:spPr/>
         <p:txBody>
           <a:bodyPr/>
-          <a:lstStyle/>
           <a:p>
             <a:fld id="{C944E1D5-9E5A-4C01-9136-05C78765746C}" type="datetimeFigureOut">
               <a:rPr lang="en-US" smtClean="0"/>
@@ -3628,7 +3715,6 @@
         <p:spPr/>
         <p:txBody>
           <a:bodyPr/>
-          <a:lstStyle/>
           <a:p>
             <a:endParaRPr lang="en-US"/>
           </a:p>
@@ -3647,7 +3733,6 @@
         <p:spPr/>
         <p:txBody>
           <a:bodyPr/>
-          <a:lstStyle/>
           <a:p>
             <a:fld id="{69D6A1C1-99AF-4131-B133-315FDD2B84F7}" type="slidenum">
               <a:rPr lang="en-US" smtClean="0"/>
@@ -3661,6 +3746,7 @@
   <p:clrMapOvr>
     <a:masterClrMapping/>
   </p:clrMapOvr>
+  <p:hf sldNum="0" hdr="0" ftr="0" dt="0"/>
 </p:sldLayout>
 </file>
 
@@ -3668,9 +3754,12 @@
 <p:sldMaster xmlns:a="http://schemas.openxmlformats.org/drawingml/2006/main" xmlns:r="http://schemas.openxmlformats.org/officeDocument/2006/relationships" xmlns:p="http://schemas.openxmlformats.org/presentationml/2006/main">
   <p:cSld>
     <p:bg>
-      <p:bgRef idx="1001">
-        <a:schemeClr val="bg1"/>
-      </p:bgRef>
+      <p:bgPr>
+        <a:solidFill>
+          <a:schemeClr val="bg1"/>
+        </a:solidFill>
+        <a:effectLst/>
+      </p:bgPr>
     </p:bg>
     <p:spTree>
       <p:nvGrpSpPr>
@@ -3678,17 +3767,38 @@
         <p:cNvGrpSpPr/>
         <p:nvPr/>
       </p:nvGrpSpPr>
-      <p:grpSpPr>
-        <a:xfrm>
-          <a:off x="0" y="0"/>
-          <a:ext cx="0" cy="0"/>
-          <a:chOff x="0" y="0"/>
-          <a:chExt cx="0" cy="0"/>
-        </a:xfrm>
-      </p:grpSpPr>
+      <p:grpSpPr/>
+      <p:pic>
+        <p:nvPicPr>
+          <p:cNvPr id="1026" name="Picture 2"/>
+          <p:cNvPicPr>
+            <a:picLocks noChangeAspect="1"/>
+          </p:cNvPicPr>
+          <p:nvPr/>
+        </p:nvPicPr>
+        <p:blipFill>
+          <a:blip r:embed="rId12"/>
+          <a:stretch>
+            <a:fillRect/>
+          </a:stretch>
+        </p:blipFill>
+        <p:spPr>
+          <a:xfrm>
+            <a:off x="0" y="0"/>
+            <a:ext cx="12192000" cy="6858000"/>
+          </a:xfrm>
+          <a:prstGeom prst="rect">
+            <a:avLst/>
+          </a:prstGeom>
+          <a:noFill/>
+          <a:ln w="9525">
+            <a:noFill/>
+          </a:ln>
+        </p:spPr>
+      </p:pic>
       <p:sp>
         <p:nvSpPr>
-          <p:cNvPr id="2" name="Title Placeholder 1"/>
+          <p:cNvPr id="1027" name="Rectangle 3"/>
           <p:cNvSpPr>
             <a:spLocks noGrp="1"/>
           </p:cNvSpPr>
@@ -3698,30 +3808,32 @@
         </p:nvSpPr>
         <p:spPr>
           <a:xfrm>
-            <a:off x="838200" y="365125"/>
-            <a:ext cx="10515600" cy="1325563"/>
+            <a:off x="609600" y="190500"/>
+            <a:ext cx="10972800" cy="582613"/>
           </a:xfrm>
           <a:prstGeom prst="rect">
             <a:avLst/>
           </a:prstGeom>
+          <a:noFill/>
+          <a:ln w="9525">
+            <a:noFill/>
+          </a:ln>
         </p:spPr>
         <p:txBody>
-          <a:bodyPr vert="horz" lIns="91440" tIns="45720" rIns="91440" bIns="45720" rtlCol="0" anchor="ctr">
-            <a:normAutofit/>
-          </a:bodyPr>
-          <a:lstStyle/>
-          <a:p>
-            <a:r>
-              <a:rPr lang="en-US"/>
+          <a:bodyPr anchor="ctr"/>
+          <a:p>
+            <a:pPr lvl="0"/>
+            <a:r>
+              <a:rPr lang="en-US" altLang="zh-CN" dirty="0"/>
               <a:t>Click to edit Master title style</a:t>
             </a:r>
-            <a:endParaRPr lang="en-US"/>
+            <a:endParaRPr lang="en-US" altLang="zh-CN" dirty="0"/>
           </a:p>
         </p:txBody>
       </p:sp>
       <p:sp>
         <p:nvSpPr>
-          <p:cNvPr id="3" name="Text Placeholder 2"/>
+          <p:cNvPr id="1028" name="Rectangle 4"/>
           <p:cNvSpPr>
             <a:spLocks noGrp="1"/>
           </p:cNvSpPr>
@@ -3731,90 +3843,118 @@
         </p:nvSpPr>
         <p:spPr>
           <a:xfrm>
-            <a:off x="838200" y="1825625"/>
-            <a:ext cx="10515600" cy="4351338"/>
+            <a:off x="609600" y="1174750"/>
+            <a:ext cx="10972800" cy="4953000"/>
           </a:xfrm>
           <a:prstGeom prst="rect">
             <a:avLst/>
           </a:prstGeom>
+          <a:noFill/>
+          <a:ln w="9525">
+            <a:noFill/>
+          </a:ln>
         </p:spPr>
         <p:txBody>
-          <a:bodyPr vert="horz" lIns="91440" tIns="45720" rIns="91440" bIns="45720" rtlCol="0">
-            <a:normAutofit/>
-          </a:bodyPr>
-          <a:lstStyle/>
+          <a:bodyPr/>
           <a:p>
             <a:pPr lvl="0"/>
             <a:r>
-              <a:rPr lang="en-US"/>
+              <a:rPr lang="en-US" altLang="zh-CN" dirty="0"/>
               <a:t>Click to edit Master text styles</a:t>
             </a:r>
-            <a:endParaRPr lang="en-US"/>
+            <a:endParaRPr lang="en-US" altLang="zh-CN" dirty="0"/>
           </a:p>
           <a:p>
             <a:pPr lvl="1"/>
             <a:r>
-              <a:rPr lang="en-US"/>
+              <a:rPr lang="en-US" altLang="zh-CN" dirty="0"/>
               <a:t>Second level</a:t>
             </a:r>
-            <a:endParaRPr lang="en-US"/>
+            <a:endParaRPr lang="en-US" altLang="zh-CN" dirty="0"/>
           </a:p>
           <a:p>
             <a:pPr lvl="2"/>
             <a:r>
-              <a:rPr lang="en-US"/>
+              <a:rPr lang="en-US" altLang="zh-CN" dirty="0"/>
               <a:t>Third level</a:t>
             </a:r>
-            <a:endParaRPr lang="en-US"/>
+            <a:endParaRPr lang="en-US" altLang="zh-CN" dirty="0"/>
           </a:p>
           <a:p>
             <a:pPr lvl="3"/>
             <a:r>
-              <a:rPr lang="en-US"/>
+              <a:rPr lang="en-US" altLang="zh-CN" dirty="0"/>
               <a:t>Fourth level</a:t>
             </a:r>
-            <a:endParaRPr lang="en-US"/>
+            <a:endParaRPr lang="en-US" altLang="zh-CN" dirty="0"/>
           </a:p>
           <a:p>
             <a:pPr lvl="4"/>
             <a:r>
-              <a:rPr lang="en-US"/>
+              <a:rPr lang="en-US" altLang="zh-CN" dirty="0"/>
               <a:t>Fifth level</a:t>
             </a:r>
-            <a:endParaRPr lang="en-US"/>
+            <a:endParaRPr lang="en-US" altLang="zh-CN" dirty="0"/>
           </a:p>
         </p:txBody>
       </p:sp>
       <p:sp>
         <p:nvSpPr>
-          <p:cNvPr id="4" name="Date Placeholder 3"/>
+          <p:cNvPr id="1029" name="Rectangle 5"/>
           <p:cNvSpPr>
-            <a:spLocks noGrp="1"/>
+            <a:spLocks noGrp="1" noChangeArrowheads="1"/>
           </p:cNvSpPr>
           <p:nvPr>
             <p:ph type="dt" sz="half" idx="2"/>
           </p:nvPr>
         </p:nvSpPr>
-        <p:spPr>
+        <p:spPr bwMode="auto">
           <a:xfrm>
-            <a:off x="838200" y="6356350"/>
-            <a:ext cx="2743200" cy="365125"/>
+            <a:off x="609600" y="6245225"/>
+            <a:ext cx="2844800" cy="476250"/>
           </a:xfrm>
           <a:prstGeom prst="rect">
             <a:avLst/>
           </a:prstGeom>
+          <a:noFill/>
+          <a:ln>
+            <a:noFill/>
+          </a:ln>
+          <a:effectLst/>
+          <a:extLst>
+            <a:ext uri="{909E8E84-426E-40DD-AFC4-6F175D3DCCD1}">
+              <a14:hiddenFill xmlns:a14="http://schemas.microsoft.com/office/drawing/2010/main">
+                <a:solidFill>
+                  <a:schemeClr val="accent1"/>
+                </a:solidFill>
+              </a14:hiddenFill>
+            </a:ext>
+            <a:ext uri="{91240B29-F687-4F45-9708-019B960494DF}">
+              <a14:hiddenLine xmlns:a14="http://schemas.microsoft.com/office/drawing/2010/main" w="9525">
+                <a:solidFill>
+                  <a:srgbClr val="000000"/>
+                </a:solidFill>
+                <a:miter lim="800000"/>
+                <a:headEnd/>
+                <a:tailEnd/>
+              </a14:hiddenLine>
+            </a:ext>
+            <a:ext uri="{AF507438-7753-43E0-B8FC-AC1667EBCBE1}">
+              <a14:hiddenEffects xmlns:a14="http://schemas.microsoft.com/office/drawing/2010/main">
+                <a:effectLst>
+                  <a:outerShdw dist="35921" dir="2700000" algn="ctr" rotWithShape="0">
+                    <a:schemeClr val="bg2"/>
+                  </a:outerShdw>
+                </a:effectLst>
+              </a14:hiddenEffects>
+            </a:ext>
+          </a:extLst>
         </p:spPr>
         <p:txBody>
-          <a:bodyPr vert="horz" lIns="91440" tIns="45720" rIns="91440" bIns="45720" rtlCol="0" anchor="ctr"/>
+          <a:bodyPr vert="horz" wrap="square" lIns="91440" tIns="45720" rIns="91440" bIns="45720" numCol="1" anchor="t" anchorCtr="0" compatLnSpc="1"/>
           <a:lstStyle>
-            <a:lvl1pPr algn="l">
-              <a:defRPr sz="1200">
-                <a:solidFill>
-                  <a:schemeClr val="tx1">
-                    <a:tint val="82000"/>
-                  </a:schemeClr>
-                </a:solidFill>
-              </a:defRPr>
+            <a:lvl1pPr>
+              <a:defRPr sz="1400"/>
             </a:lvl1pPr>
           </a:lstStyle>
           <a:p>
@@ -3827,34 +3967,61 @@
       </p:sp>
       <p:sp>
         <p:nvSpPr>
-          <p:cNvPr id="5" name="Footer Placeholder 4"/>
+          <p:cNvPr id="1030" name="Rectangle 6"/>
           <p:cNvSpPr>
-            <a:spLocks noGrp="1"/>
+            <a:spLocks noGrp="1" noChangeArrowheads="1"/>
           </p:cNvSpPr>
           <p:nvPr>
             <p:ph type="ftr" sz="quarter" idx="3"/>
           </p:nvPr>
         </p:nvSpPr>
-        <p:spPr>
+        <p:spPr bwMode="auto">
           <a:xfrm>
-            <a:off x="4038600" y="6356350"/>
-            <a:ext cx="4114800" cy="365125"/>
+            <a:off x="4165600" y="6245225"/>
+            <a:ext cx="3860800" cy="476250"/>
           </a:xfrm>
           <a:prstGeom prst="rect">
             <a:avLst/>
           </a:prstGeom>
+          <a:noFill/>
+          <a:ln>
+            <a:noFill/>
+          </a:ln>
+          <a:effectLst/>
+          <a:extLst>
+            <a:ext uri="{909E8E84-426E-40DD-AFC4-6F175D3DCCD1}">
+              <a14:hiddenFill xmlns:a14="http://schemas.microsoft.com/office/drawing/2010/main">
+                <a:solidFill>
+                  <a:schemeClr val="accent1"/>
+                </a:solidFill>
+              </a14:hiddenFill>
+            </a:ext>
+            <a:ext uri="{91240B29-F687-4F45-9708-019B960494DF}">
+              <a14:hiddenLine xmlns:a14="http://schemas.microsoft.com/office/drawing/2010/main" w="9525">
+                <a:solidFill>
+                  <a:srgbClr val="000000"/>
+                </a:solidFill>
+                <a:miter lim="800000"/>
+                <a:headEnd/>
+                <a:tailEnd/>
+              </a14:hiddenLine>
+            </a:ext>
+            <a:ext uri="{AF507438-7753-43E0-B8FC-AC1667EBCBE1}">
+              <a14:hiddenEffects xmlns:a14="http://schemas.microsoft.com/office/drawing/2010/main">
+                <a:effectLst>
+                  <a:outerShdw dist="35921" dir="2700000" algn="ctr" rotWithShape="0">
+                    <a:schemeClr val="bg2"/>
+                  </a:outerShdw>
+                </a:effectLst>
+              </a14:hiddenEffects>
+            </a:ext>
+          </a:extLst>
         </p:spPr>
         <p:txBody>
-          <a:bodyPr vert="horz" lIns="91440" tIns="45720" rIns="91440" bIns="45720" rtlCol="0" anchor="ctr"/>
+          <a:bodyPr vert="horz" wrap="square" lIns="91440" tIns="45720" rIns="91440" bIns="45720" numCol="1" anchor="t" anchorCtr="0" compatLnSpc="1"/>
           <a:lstStyle>
             <a:lvl1pPr algn="ctr">
-              <a:defRPr sz="1200">
-                <a:solidFill>
-                  <a:schemeClr val="tx1">
-                    <a:tint val="82000"/>
-                  </a:schemeClr>
-                </a:solidFill>
-              </a:defRPr>
+              <a:defRPr sz="1400"/>
             </a:lvl1pPr>
           </a:lstStyle>
           <a:p>
@@ -3864,34 +4031,61 @@
       </p:sp>
       <p:sp>
         <p:nvSpPr>
-          <p:cNvPr id="6" name="Slide Number Placeholder 5"/>
+          <p:cNvPr id="1031" name="Rectangle 7"/>
           <p:cNvSpPr>
-            <a:spLocks noGrp="1"/>
+            <a:spLocks noGrp="1" noChangeArrowheads="1"/>
           </p:cNvSpPr>
           <p:nvPr>
             <p:ph type="sldNum" sz="quarter" idx="4"/>
           </p:nvPr>
         </p:nvSpPr>
-        <p:spPr>
+        <p:spPr bwMode="auto">
           <a:xfrm>
-            <a:off x="8610600" y="6356350"/>
-            <a:ext cx="2743200" cy="365125"/>
+            <a:off x="8737600" y="6245225"/>
+            <a:ext cx="2844800" cy="476250"/>
           </a:xfrm>
           <a:prstGeom prst="rect">
             <a:avLst/>
           </a:prstGeom>
+          <a:noFill/>
+          <a:ln>
+            <a:noFill/>
+          </a:ln>
+          <a:effectLst/>
+          <a:extLst>
+            <a:ext uri="{909E8E84-426E-40DD-AFC4-6F175D3DCCD1}">
+              <a14:hiddenFill xmlns:a14="http://schemas.microsoft.com/office/drawing/2010/main">
+                <a:solidFill>
+                  <a:schemeClr val="accent1"/>
+                </a:solidFill>
+              </a14:hiddenFill>
+            </a:ext>
+            <a:ext uri="{91240B29-F687-4F45-9708-019B960494DF}">
+              <a14:hiddenLine xmlns:a14="http://schemas.microsoft.com/office/drawing/2010/main" w="9525">
+                <a:solidFill>
+                  <a:srgbClr val="000000"/>
+                </a:solidFill>
+                <a:miter lim="800000"/>
+                <a:headEnd/>
+                <a:tailEnd/>
+              </a14:hiddenLine>
+            </a:ext>
+            <a:ext uri="{AF507438-7753-43E0-B8FC-AC1667EBCBE1}">
+              <a14:hiddenEffects xmlns:a14="http://schemas.microsoft.com/office/drawing/2010/main">
+                <a:effectLst>
+                  <a:outerShdw dist="35921" dir="2700000" algn="ctr" rotWithShape="0">
+                    <a:schemeClr val="bg2"/>
+                  </a:outerShdw>
+                </a:effectLst>
+              </a14:hiddenEffects>
+            </a:ext>
+          </a:extLst>
         </p:spPr>
         <p:txBody>
-          <a:bodyPr vert="horz" lIns="91440" tIns="45720" rIns="91440" bIns="45720" rtlCol="0" anchor="ctr"/>
+          <a:bodyPr vert="horz" wrap="square" lIns="91440" tIns="45720" rIns="91440" bIns="45720" numCol="1" anchor="t" anchorCtr="0" compatLnSpc="1"/>
           <a:lstStyle>
             <a:lvl1pPr algn="r">
-              <a:defRPr sz="1200">
-                <a:solidFill>
-                  <a:schemeClr val="tx1">
-                    <a:tint val="82000"/>
-                  </a:schemeClr>
-                </a:solidFill>
-              </a:defRPr>
+              <a:defRPr sz="1400"/>
             </a:lvl1pPr>
           </a:lstStyle>
           <a:p>
@@ -3918,17 +4112,17 @@
     <p:sldLayoutId id="2147483658" r:id="rId10"/>
     <p:sldLayoutId id="2147483659" r:id="rId11"/>
   </p:sldLayoutIdLst>
+  <p:hf sldNum="0" hdr="0" ftr="0" dt="0"/>
   <p:txStyles>
     <p:titleStyle>
-      <a:lvl1pPr algn="l" defTabSz="914400" rtl="0" eaLnBrk="1" latinLnBrk="0" hangingPunct="1">
-        <a:lnSpc>
-          <a:spcPct val="90000"/>
-        </a:lnSpc>
+      <a:lvl1pPr algn="l" rtl="0" fontAlgn="base">
         <a:spcBef>
           <a:spcPct val="0"/>
         </a:spcBef>
-        <a:buNone/>
-        <a:defRPr sz="4400" kern="1200">
+        <a:spcAft>
+          <a:spcPct val="0"/>
+        </a:spcAft>
+        <a:defRPr sz="3600" kern="1200">
           <a:solidFill>
             <a:schemeClr val="tx1"/>
           </a:solidFill>
@@ -3937,17 +4131,153 @@
           <a:cs typeface="+mj-cs"/>
         </a:defRPr>
       </a:lvl1pPr>
+      <a:lvl2pPr algn="l" rtl="0" fontAlgn="base">
+        <a:spcBef>
+          <a:spcPct val="0"/>
+        </a:spcBef>
+        <a:spcAft>
+          <a:spcPct val="0"/>
+        </a:spcAft>
+        <a:defRPr sz="3600">
+          <a:solidFill>
+            <a:schemeClr val="tx1"/>
+          </a:solidFill>
+          <a:latin typeface="Arial" panose="020B0604020202090204" pitchFamily="34" charset="0"/>
+          <a:ea typeface="SimSun" pitchFamily="2" charset="-122"/>
+        </a:defRPr>
+      </a:lvl2pPr>
+      <a:lvl3pPr algn="l" rtl="0" fontAlgn="base">
+        <a:spcBef>
+          <a:spcPct val="0"/>
+        </a:spcBef>
+        <a:spcAft>
+          <a:spcPct val="0"/>
+        </a:spcAft>
+        <a:defRPr sz="3600">
+          <a:solidFill>
+            <a:schemeClr val="tx1"/>
+          </a:solidFill>
+          <a:latin typeface="Arial" panose="020B0604020202090204" pitchFamily="34" charset="0"/>
+          <a:ea typeface="SimSun" pitchFamily="2" charset="-122"/>
+        </a:defRPr>
+      </a:lvl3pPr>
+      <a:lvl4pPr algn="l" rtl="0" fontAlgn="base">
+        <a:spcBef>
+          <a:spcPct val="0"/>
+        </a:spcBef>
+        <a:spcAft>
+          <a:spcPct val="0"/>
+        </a:spcAft>
+        <a:defRPr sz="3600">
+          <a:solidFill>
+            <a:schemeClr val="tx1"/>
+          </a:solidFill>
+          <a:latin typeface="Arial" panose="020B0604020202090204" pitchFamily="34" charset="0"/>
+          <a:ea typeface="SimSun" pitchFamily="2" charset="-122"/>
+        </a:defRPr>
+      </a:lvl4pPr>
+      <a:lvl5pPr algn="l" rtl="0" fontAlgn="base">
+        <a:spcBef>
+          <a:spcPct val="0"/>
+        </a:spcBef>
+        <a:spcAft>
+          <a:spcPct val="0"/>
+        </a:spcAft>
+        <a:defRPr sz="3600">
+          <a:solidFill>
+            <a:schemeClr val="tx1"/>
+          </a:solidFill>
+          <a:latin typeface="Arial" panose="020B0604020202090204" pitchFamily="34" charset="0"/>
+          <a:ea typeface="SimSun" pitchFamily="2" charset="-122"/>
+        </a:defRPr>
+      </a:lvl5pPr>
+      <a:lvl6pPr marL="457200" algn="l" rtl="0" fontAlgn="base">
+        <a:spcBef>
+          <a:spcPct val="0"/>
+        </a:spcBef>
+        <a:spcAft>
+          <a:spcPct val="0"/>
+        </a:spcAft>
+        <a:defRPr sz="3600">
+          <a:solidFill>
+            <a:schemeClr val="tx1"/>
+          </a:solidFill>
+          <a:latin typeface="Arial" panose="020B0604020202090204" pitchFamily="34" charset="0"/>
+          <a:ea typeface="SimSun" pitchFamily="2" charset="-122"/>
+        </a:defRPr>
+      </a:lvl6pPr>
+      <a:lvl7pPr marL="914400" algn="l" rtl="0" fontAlgn="base">
+        <a:spcBef>
+          <a:spcPct val="0"/>
+        </a:spcBef>
+        <a:spcAft>
+          <a:spcPct val="0"/>
+        </a:spcAft>
+        <a:defRPr sz="3600">
+          <a:solidFill>
+            <a:schemeClr val="tx1"/>
+          </a:solidFill>
+          <a:latin typeface="Arial" panose="020B0604020202090204" pitchFamily="34" charset="0"/>
+          <a:ea typeface="SimSun" pitchFamily="2" charset="-122"/>
+        </a:defRPr>
+      </a:lvl7pPr>
+      <a:lvl8pPr marL="1371600" algn="l" rtl="0" fontAlgn="base">
+        <a:spcBef>
+          <a:spcPct val="0"/>
+        </a:spcBef>
+        <a:spcAft>
+          <a:spcPct val="0"/>
+        </a:spcAft>
+        <a:defRPr sz="3600">
+          <a:solidFill>
+            <a:schemeClr val="tx1"/>
+          </a:solidFill>
+          <a:latin typeface="Arial" panose="020B0604020202090204" pitchFamily="34" charset="0"/>
+          <a:ea typeface="SimSun" pitchFamily="2" charset="-122"/>
+        </a:defRPr>
+      </a:lvl8pPr>
+      <a:lvl9pPr marL="1828800" algn="l" rtl="0" fontAlgn="base">
+        <a:spcBef>
+          <a:spcPct val="0"/>
+        </a:spcBef>
+        <a:spcAft>
+          <a:spcPct val="0"/>
+        </a:spcAft>
+        <a:defRPr sz="3600">
+          <a:solidFill>
+            <a:schemeClr val="tx1"/>
+          </a:solidFill>
+          <a:latin typeface="Arial" panose="020B0604020202090204" pitchFamily="34" charset="0"/>
+          <a:ea typeface="SimSun" pitchFamily="2" charset="-122"/>
+        </a:defRPr>
+      </a:lvl9pPr>
     </p:titleStyle>
     <p:bodyStyle>
-      <a:lvl1pPr marL="228600" indent="-228600" algn="l" defTabSz="914400" rtl="0" eaLnBrk="1" latinLnBrk="0" hangingPunct="1">
-        <a:lnSpc>
-          <a:spcPct val="90000"/>
-        </a:lnSpc>
+      <a:lvl1pPr marL="342900" indent="-342900" algn="l" rtl="0" fontAlgn="base">
         <a:spcBef>
-          <a:spcPts val="1000"/>
+          <a:spcPct val="20000"/>
         </a:spcBef>
-        <a:buFont typeface="Arial" panose="020B0604020202090204" pitchFamily="34" charset="0"/>
+        <a:spcAft>
+          <a:spcPct val="0"/>
+        </a:spcAft>
         <a:buChar char="•"/>
+        <a:defRPr sz="3200" kern="1200">
+          <a:solidFill>
+            <a:schemeClr val="tx1"/>
+          </a:solidFill>
+          <a:latin typeface="+mn-lt"/>
+          <a:ea typeface="+mn-ea"/>
+          <a:cs typeface="+mn-cs"/>
+        </a:defRPr>
+      </a:lvl1pPr>
+      <a:lvl2pPr marL="742950" indent="-285750" algn="l" rtl="0" fontAlgn="base">
+        <a:spcBef>
+          <a:spcPct val="20000"/>
+        </a:spcBef>
+        <a:spcAft>
+          <a:spcPct val="0"/>
+        </a:spcAft>
+        <a:buChar char="–"/>
         <a:defRPr sz="2800" kern="1200">
           <a:solidFill>
             <a:schemeClr val="tx1"/>
@@ -3956,15 +4286,14 @@
           <a:ea typeface="+mn-ea"/>
           <a:cs typeface="+mn-cs"/>
         </a:defRPr>
-      </a:lvl1pPr>
-      <a:lvl2pPr marL="685800" indent="-228600" algn="l" defTabSz="914400" rtl="0" eaLnBrk="1" latinLnBrk="0" hangingPunct="1">
-        <a:lnSpc>
-          <a:spcPct val="90000"/>
-        </a:lnSpc>
+      </a:lvl2pPr>
+      <a:lvl3pPr marL="1143000" indent="-228600" algn="l" rtl="0" fontAlgn="base">
         <a:spcBef>
-          <a:spcPts val="500"/>
+          <a:spcPct val="20000"/>
         </a:spcBef>
-        <a:buFont typeface="Arial" panose="020B0604020202090204" pitchFamily="34" charset="0"/>
+        <a:spcAft>
+          <a:spcPct val="0"/>
+        </a:spcAft>
         <a:buChar char="•"/>
         <a:defRPr sz="2400" kern="1200">
           <a:solidFill>
@@ -3974,16 +4303,15 @@
           <a:ea typeface="+mn-ea"/>
           <a:cs typeface="+mn-cs"/>
         </a:defRPr>
-      </a:lvl2pPr>
-      <a:lvl3pPr marL="1143000" indent="-228600" algn="l" defTabSz="914400" rtl="0" eaLnBrk="1" latinLnBrk="0" hangingPunct="1">
-        <a:lnSpc>
-          <a:spcPct val="90000"/>
-        </a:lnSpc>
+      </a:lvl3pPr>
+      <a:lvl4pPr marL="1600200" indent="-228600" algn="l" rtl="0" fontAlgn="base">
         <a:spcBef>
-          <a:spcPts val="500"/>
+          <a:spcPct val="20000"/>
         </a:spcBef>
-        <a:buFont typeface="Arial" panose="020B0604020202090204" pitchFamily="34" charset="0"/>
-        <a:buChar char="•"/>
+        <a:spcAft>
+          <a:spcPct val="0"/>
+        </a:spcAft>
+        <a:buChar char="–"/>
         <a:defRPr sz="2000" kern="1200">
           <a:solidFill>
             <a:schemeClr val="tx1"/>
@@ -3992,35 +4320,16 @@
           <a:ea typeface="+mn-ea"/>
           <a:cs typeface="+mn-cs"/>
         </a:defRPr>
-      </a:lvl3pPr>
-      <a:lvl4pPr marL="1600200" indent="-228600" algn="l" defTabSz="914400" rtl="0" eaLnBrk="1" latinLnBrk="0" hangingPunct="1">
-        <a:lnSpc>
-          <a:spcPct val="90000"/>
-        </a:lnSpc>
+      </a:lvl4pPr>
+      <a:lvl5pPr marL="2057400" indent="-228600" algn="l" rtl="0" fontAlgn="base">
         <a:spcBef>
-          <a:spcPts val="500"/>
+          <a:spcPct val="20000"/>
         </a:spcBef>
-        <a:buFont typeface="Arial" panose="020B0604020202090204" pitchFamily="34" charset="0"/>
-        <a:buChar char="•"/>
-        <a:defRPr sz="1800" kern="1200">
-          <a:solidFill>
-            <a:schemeClr val="tx1"/>
-          </a:solidFill>
-          <a:latin typeface="+mn-lt"/>
-          <a:ea typeface="+mn-ea"/>
-          <a:cs typeface="+mn-cs"/>
-        </a:defRPr>
-      </a:lvl4pPr>
-      <a:lvl5pPr marL="2057400" indent="-228600" algn="l" defTabSz="914400" rtl="0" eaLnBrk="1" latinLnBrk="0" hangingPunct="1">
-        <a:lnSpc>
-          <a:spcPct val="90000"/>
-        </a:lnSpc>
-        <a:spcBef>
-          <a:spcPts val="500"/>
-        </a:spcBef>
-        <a:buFont typeface="Arial" panose="020B0604020202090204" pitchFamily="34" charset="0"/>
-        <a:buChar char="•"/>
-        <a:defRPr sz="1800" kern="1200">
+        <a:spcAft>
+          <a:spcPct val="0"/>
+        </a:spcAft>
+        <a:buChar char="»"/>
+        <a:defRPr sz="2000" kern="1200">
           <a:solidFill>
             <a:schemeClr val="tx1"/>
           </a:solidFill>
@@ -4235,6 +4544,7 @@
           </a:bodyPr>
           <a:lstStyle/>
           <a:p>
+            <a:pPr algn="ctr"/>
             <a:r>
               <a:rPr lang="en-US" sz="4000" b="1" kern="0" dirty="0">
                 <a:solidFill>
@@ -4259,16 +4569,274 @@
             <p:ph type="subTitle" idx="1"/>
           </p:nvPr>
         </p:nvSpPr>
-        <p:spPr/>
+        <p:spPr>
+          <a:xfrm>
+            <a:off x="2311400" y="1810385"/>
+            <a:ext cx="8781415" cy="1162685"/>
+          </a:xfrm>
+        </p:spPr>
         <p:txBody>
           <a:bodyPr/>
           <a:lstStyle/>
           <a:p>
-            <a:endParaRPr lang="en-US" dirty="0"/>
+            <a:r>
+              <a:rPr lang="en-US" dirty="0"/>
+              <a:t>Gi</a:t>
+            </a:r>
+            <a:r>
+              <a:rPr lang="vi-VN" altLang="en-US" dirty="0"/>
+              <a:t>ảng viên: PhD. Nguyễn Vinh Tiệp</a:t>
+            </a:r>
+            <a:endParaRPr lang="vi-VN" altLang="en-US" sz="3200" dirty="0"/>
+          </a:p>
+          <a:p>
+            <a:endParaRPr lang="vi-VN" altLang="en-US" dirty="0"/>
+          </a:p>
+          <a:p>
+            <a:pPr lvl="7"/>
+            <a:endParaRPr lang="vi-VN" altLang="en-US" dirty="0"/>
+          </a:p>
+        </p:txBody>
+      </p:sp>
+      <p:sp>
+        <p:nvSpPr>
+          <p:cNvPr id="5" name="Subtitle 2"/>
+          <p:cNvSpPr>
+            <a:spLocks noGrp="1"/>
+          </p:cNvSpPr>
+          <p:nvPr/>
+        </p:nvSpPr>
+        <p:spPr>
+          <a:xfrm>
+            <a:off x="624205" y="3188335"/>
+            <a:ext cx="10468610" cy="2166620"/>
+          </a:xfrm>
+          <a:prstGeom prst="rect">
+            <a:avLst/>
+          </a:prstGeom>
+          <a:noFill/>
+          <a:ln w="9525">
+            <a:noFill/>
+          </a:ln>
+        </p:spPr>
+        <p:txBody>
+          <a:bodyPr/>
+          <a:lstStyle>
+            <a:lvl1pPr marL="0" indent="0" algn="l" rtl="0" fontAlgn="base">
+              <a:spcBef>
+                <a:spcPct val="20000"/>
+              </a:spcBef>
+              <a:spcAft>
+                <a:spcPct val="0"/>
+              </a:spcAft>
+              <a:buFontTx/>
+              <a:buNone/>
+              <a:defRPr sz="3200" kern="1200">
+                <a:solidFill>
+                  <a:schemeClr val="tx1"/>
+                </a:solidFill>
+                <a:latin typeface="+mn-lt"/>
+                <a:ea typeface="+mn-ea"/>
+                <a:cs typeface="+mn-cs"/>
+              </a:defRPr>
+            </a:lvl1pPr>
+            <a:lvl2pPr marL="742950" indent="-285750" algn="l" rtl="0" fontAlgn="base">
+              <a:spcBef>
+                <a:spcPct val="20000"/>
+              </a:spcBef>
+              <a:spcAft>
+                <a:spcPct val="0"/>
+              </a:spcAft>
+              <a:buChar char="–"/>
+              <a:defRPr sz="2800" kern="1200">
+                <a:solidFill>
+                  <a:schemeClr val="tx1"/>
+                </a:solidFill>
+                <a:latin typeface="+mn-lt"/>
+                <a:ea typeface="+mn-ea"/>
+                <a:cs typeface="+mn-cs"/>
+              </a:defRPr>
+            </a:lvl2pPr>
+            <a:lvl3pPr marL="1143000" indent="-228600" algn="l" rtl="0" fontAlgn="base">
+              <a:spcBef>
+                <a:spcPct val="20000"/>
+              </a:spcBef>
+              <a:spcAft>
+                <a:spcPct val="0"/>
+              </a:spcAft>
+              <a:buChar char="•"/>
+              <a:defRPr sz="2400" kern="1200">
+                <a:solidFill>
+                  <a:schemeClr val="tx1"/>
+                </a:solidFill>
+                <a:latin typeface="+mn-lt"/>
+                <a:ea typeface="+mn-ea"/>
+                <a:cs typeface="+mn-cs"/>
+              </a:defRPr>
+            </a:lvl3pPr>
+            <a:lvl4pPr marL="1600200" indent="-228600" algn="l" rtl="0" fontAlgn="base">
+              <a:spcBef>
+                <a:spcPct val="20000"/>
+              </a:spcBef>
+              <a:spcAft>
+                <a:spcPct val="0"/>
+              </a:spcAft>
+              <a:buChar char="–"/>
+              <a:defRPr sz="2000" kern="1200">
+                <a:solidFill>
+                  <a:schemeClr val="tx1"/>
+                </a:solidFill>
+                <a:latin typeface="+mn-lt"/>
+                <a:ea typeface="+mn-ea"/>
+                <a:cs typeface="+mn-cs"/>
+              </a:defRPr>
+            </a:lvl4pPr>
+            <a:lvl5pPr marL="2057400" indent="-228600" algn="l" rtl="0" fontAlgn="base">
+              <a:spcBef>
+                <a:spcPct val="20000"/>
+              </a:spcBef>
+              <a:spcAft>
+                <a:spcPct val="0"/>
+              </a:spcAft>
+              <a:buChar char="»"/>
+              <a:defRPr sz="2000" kern="1200">
+                <a:solidFill>
+                  <a:schemeClr val="tx1"/>
+                </a:solidFill>
+                <a:latin typeface="+mn-lt"/>
+                <a:ea typeface="+mn-ea"/>
+                <a:cs typeface="+mn-cs"/>
+              </a:defRPr>
+            </a:lvl5pPr>
+            <a:lvl6pPr marL="2514600" indent="-228600" algn="l" defTabSz="914400" rtl="0" eaLnBrk="1" latinLnBrk="0" hangingPunct="1">
+              <a:lnSpc>
+                <a:spcPct val="90000"/>
+              </a:lnSpc>
+              <a:spcBef>
+                <a:spcPts val="500"/>
+              </a:spcBef>
+              <a:buFont typeface="Arial" panose="020B0604020202090204" pitchFamily="34" charset="0"/>
+              <a:buChar char="•"/>
+              <a:defRPr sz="1800" kern="1200">
+                <a:solidFill>
+                  <a:schemeClr val="tx1"/>
+                </a:solidFill>
+                <a:latin typeface="+mn-lt"/>
+                <a:ea typeface="+mn-ea"/>
+                <a:cs typeface="+mn-cs"/>
+              </a:defRPr>
+            </a:lvl6pPr>
+            <a:lvl7pPr marL="2971800" indent="-228600" algn="l" defTabSz="914400" rtl="0" eaLnBrk="1" latinLnBrk="0" hangingPunct="1">
+              <a:lnSpc>
+                <a:spcPct val="90000"/>
+              </a:lnSpc>
+              <a:spcBef>
+                <a:spcPts val="500"/>
+              </a:spcBef>
+              <a:buFont typeface="Arial" panose="020B0604020202090204" pitchFamily="34" charset="0"/>
+              <a:buChar char="•"/>
+              <a:defRPr sz="1800" kern="1200">
+                <a:solidFill>
+                  <a:schemeClr val="tx1"/>
+                </a:solidFill>
+                <a:latin typeface="+mn-lt"/>
+                <a:ea typeface="+mn-ea"/>
+                <a:cs typeface="+mn-cs"/>
+              </a:defRPr>
+            </a:lvl7pPr>
+            <a:lvl8pPr marL="3429000" indent="-228600" algn="l" defTabSz="914400" rtl="0" eaLnBrk="1" latinLnBrk="0" hangingPunct="1">
+              <a:lnSpc>
+                <a:spcPct val="90000"/>
+              </a:lnSpc>
+              <a:spcBef>
+                <a:spcPts val="500"/>
+              </a:spcBef>
+              <a:buFont typeface="Arial" panose="020B0604020202090204" pitchFamily="34" charset="0"/>
+              <a:buChar char="•"/>
+              <a:defRPr sz="1800" kern="1200">
+                <a:solidFill>
+                  <a:schemeClr val="tx1"/>
+                </a:solidFill>
+                <a:latin typeface="+mn-lt"/>
+                <a:ea typeface="+mn-ea"/>
+                <a:cs typeface="+mn-cs"/>
+              </a:defRPr>
+            </a:lvl8pPr>
+            <a:lvl9pPr marL="3886200" indent="-228600" algn="l" defTabSz="914400" rtl="0" eaLnBrk="1" latinLnBrk="0" hangingPunct="1">
+              <a:lnSpc>
+                <a:spcPct val="90000"/>
+              </a:lnSpc>
+              <a:spcBef>
+                <a:spcPts val="500"/>
+              </a:spcBef>
+              <a:buFont typeface="Arial" panose="020B0604020202090204" pitchFamily="34" charset="0"/>
+              <a:buChar char="•"/>
+              <a:defRPr sz="1800" kern="1200">
+                <a:solidFill>
+                  <a:schemeClr val="tx1"/>
+                </a:solidFill>
+                <a:latin typeface="+mn-lt"/>
+                <a:ea typeface="+mn-ea"/>
+                <a:cs typeface="+mn-cs"/>
+              </a:defRPr>
+            </a:lvl9pPr>
+          </a:lstStyle>
+          <a:p>
+            <a:r>
+              <a:rPr lang="vi-VN" altLang="en-US" sz="2500" dirty="0"/>
+              <a:t>		HV: 	     </a:t>
+            </a:r>
+            <a:r>
+              <a:rPr lang="vi-VN" altLang="en-US" sz="2500" dirty="0">
+                <a:sym typeface="+mn-ea"/>
+              </a:rPr>
+              <a:t>Nguyễn Xuân Trường - 230104027</a:t>
+            </a:r>
+            <a:endParaRPr lang="vi-VN" altLang="en-US" sz="2500" dirty="0"/>
+          </a:p>
+          <a:p>
+            <a:pPr lvl="7"/>
+            <a:r>
+              <a:rPr lang="vi-VN" altLang="en-US" sz="2500" dirty="0">
+                <a:sym typeface="+mn-ea"/>
+              </a:rPr>
+              <a:t>Nguyễn Lê Nam Anh - 230101070</a:t>
+            </a:r>
+            <a:endParaRPr lang="vi-VN" altLang="en-US" sz="2500" dirty="0"/>
+          </a:p>
+          <a:p>
+            <a:pPr lvl="7"/>
+            <a:r>
+              <a:rPr lang="vi-VN" altLang="en-US" sz="2500" dirty="0">
+                <a:sym typeface="+mn-ea"/>
+              </a:rPr>
+              <a:t>Trần Quốc Huy - 230101048</a:t>
+            </a:r>
+            <a:endParaRPr lang="vi-VN" altLang="en-US" sz="2500" dirty="0"/>
+          </a:p>
+          <a:p>
+            <a:pPr lvl="7"/>
+            <a:r>
+              <a:rPr lang="vi-VN" altLang="en-US" sz="2500" dirty="0">
+                <a:sym typeface="+mn-ea"/>
+              </a:rPr>
+              <a:t>Lê Thanh Dũng - 230101074</a:t>
+            </a:r>
+            <a:endParaRPr lang="vi-VN" altLang="en-US" sz="3200" dirty="0"/>
+          </a:p>
+          <a:p>
+            <a:endParaRPr lang="vi-VN" altLang="en-US" dirty="0"/>
+          </a:p>
+          <a:p>
+            <a:pPr lvl="7"/>
+            <a:endParaRPr lang="vi-VN" altLang="en-US" dirty="0"/>
           </a:p>
         </p:txBody>
       </p:sp>
     </p:spTree>
+    <p:custDataLst>
+      <p:tags r:id="rId1"/>
+    </p:custDataLst>
   </p:cSld>
   <p:clrMapOvr>
     <a:masterClrMapping/>
@@ -7543,113 +8111,6 @@
           <a:p>
             <a:r>
               <a:rPr lang="en-US" dirty="0" err="1"/>
-              <a:t>Kết</a:t>
-            </a:r>
-            <a:r>
-              <a:rPr lang="en-US" dirty="0"/>
-              <a:t> </a:t>
-            </a:r>
-            <a:r>
-              <a:rPr lang="en-US" dirty="0" err="1"/>
-              <a:t>luận</a:t>
-            </a:r>
-            <a:r>
-              <a:rPr lang="en-US" dirty="0"/>
-              <a:t> </a:t>
-            </a:r>
-            <a:r>
-              <a:rPr lang="en-US" dirty="0" err="1"/>
-              <a:t>và</a:t>
-            </a:r>
-            <a:r>
-              <a:rPr lang="en-US" dirty="0"/>
-              <a:t> </a:t>
-            </a:r>
-            <a:r>
-              <a:rPr lang="en-US" dirty="0" err="1"/>
-              <a:t>hướng</a:t>
-            </a:r>
-            <a:r>
-              <a:rPr lang="en-US" dirty="0"/>
-              <a:t> </a:t>
-            </a:r>
-            <a:r>
-              <a:rPr lang="en-US" dirty="0" err="1"/>
-              <a:t>phát</a:t>
-            </a:r>
-            <a:r>
-              <a:rPr lang="en-US" dirty="0"/>
-              <a:t> </a:t>
-            </a:r>
-            <a:r>
-              <a:rPr lang="en-US" dirty="0" err="1"/>
-              <a:t>triển</a:t>
-            </a:r>
-            <a:endParaRPr lang="en-US" dirty="0"/>
-          </a:p>
-        </p:txBody>
-      </p:sp>
-      <p:sp>
-        <p:nvSpPr>
-          <p:cNvPr id="3" name="Content Placeholder 2"/>
-          <p:cNvSpPr>
-            <a:spLocks noGrp="1"/>
-          </p:cNvSpPr>
-          <p:nvPr>
-            <p:ph idx="1"/>
-          </p:nvPr>
-        </p:nvSpPr>
-        <p:spPr/>
-        <p:txBody>
-          <a:bodyPr/>
-          <a:lstStyle/>
-          <a:p>
-            <a:endParaRPr lang="en-US"/>
-          </a:p>
-        </p:txBody>
-      </p:sp>
-    </p:spTree>
-  </p:cSld>
-  <p:clrMapOvr>
-    <a:masterClrMapping/>
-  </p:clrMapOvr>
-</p:sld>
-</file>
-
-<file path=ppt/slides/slide16.xml><?xml version="1.0" encoding="utf-8"?>
-<p:sld xmlns:a="http://schemas.openxmlformats.org/drawingml/2006/main" xmlns:r="http://schemas.openxmlformats.org/officeDocument/2006/relationships" xmlns:p="http://schemas.openxmlformats.org/presentationml/2006/main">
-  <p:cSld>
-    <p:spTree>
-      <p:nvGrpSpPr>
-        <p:cNvPr id="1" name=""/>
-        <p:cNvGrpSpPr/>
-        <p:nvPr/>
-      </p:nvGrpSpPr>
-      <p:grpSpPr>
-        <a:xfrm>
-          <a:off x="0" y="0"/>
-          <a:ext cx="0" cy="0"/>
-          <a:chOff x="0" y="0"/>
-          <a:chExt cx="0" cy="0"/>
-        </a:xfrm>
-      </p:grpSpPr>
-      <p:sp>
-        <p:nvSpPr>
-          <p:cNvPr id="2" name="Title 1"/>
-          <p:cNvSpPr>
-            <a:spLocks noGrp="1"/>
-          </p:cNvSpPr>
-          <p:nvPr>
-            <p:ph type="title"/>
-          </p:nvPr>
-        </p:nvSpPr>
-        <p:spPr/>
-        <p:txBody>
-          <a:bodyPr/>
-          <a:lstStyle/>
-          <a:p>
-            <a:r>
-              <a:rPr lang="en-US" dirty="0" err="1"/>
               <a:t>Tài</a:t>
             </a:r>
             <a:r>
@@ -7737,18 +8198,20 @@
         <p:spPr/>
         <p:txBody>
           <a:bodyPr>
-            <a:normAutofit/>
+            <a:normAutofit fontScale="90000"/>
           </a:bodyPr>
           <a:lstStyle/>
           <a:p>
             <a:r>
               <a:rPr lang="vi-VN" dirty="0">
-                <a:latin typeface="Aptos Display" panose="020B0004020202020204" pitchFamily="34" charset="0"/>
+                <a:latin typeface="Aptos" panose="020B0004020202020204" pitchFamily="34" charset="0"/>
+                <a:cs typeface="Aptos" panose="020B0004020202020204" pitchFamily="34" charset="0"/>
               </a:rPr>
               <a:t>Tóm tắt nội dung bài báo "Attention Is All You Need"</a:t>
             </a:r>
             <a:endParaRPr lang="en-US" dirty="0">
-              <a:latin typeface="Aptos Display" panose="020B0004020202020204" pitchFamily="34" charset="0"/>
+              <a:latin typeface="Aptos" panose="020B0004020202020204" pitchFamily="34" charset="0"/>
+              <a:cs typeface="Aptos" panose="020B0004020202020204" pitchFamily="34" charset="0"/>
             </a:endParaRPr>
           </a:p>
         </p:txBody>
@@ -7769,13 +8232,22 @@
           <a:lstStyle/>
           <a:p>
             <a:r>
-              <a:rPr lang="vi-VN" dirty="0"/>
+              <a:rPr lang="vi-VN" dirty="0">
+                <a:latin typeface="Aptos" panose="020B0004020202020204" pitchFamily="34" charset="0"/>
+                <a:cs typeface="Aptos" panose="020B0004020202020204" pitchFamily="34" charset="0"/>
+              </a:rPr>
               <a:t>Bài báo giới thiệu mô hình Transformer, một kiến trúc mạng mới dựa hoàn toàn vào cơ chế attention, không sử dụng các lớp hồi quy (RNN) hay tích chập (CNN). Transformer đã cho thấy hiệu quả vượt trội trong bài toán dịch máy và các nhiệm vụ xử lý ngôn ngữ tự nhiên khác, với ưu điểm là khả năng song song hóa cao và thời gian huấn luyện ngắn hơn đáng kể so với các mô hình truyền thống.</a:t>
             </a:r>
-            <a:endParaRPr lang="vi-VN" dirty="0"/>
-          </a:p>
-          <a:p>
-            <a:endParaRPr lang="en-US" dirty="0"/>
+            <a:endParaRPr lang="vi-VN" dirty="0">
+              <a:latin typeface="Aptos" panose="020B0004020202020204" pitchFamily="34" charset="0"/>
+              <a:cs typeface="Aptos" panose="020B0004020202020204" pitchFamily="34" charset="0"/>
+            </a:endParaRPr>
+          </a:p>
+          <a:p>
+            <a:endParaRPr lang="en-US" dirty="0">
+              <a:latin typeface="Aptos" panose="020B0004020202020204" pitchFamily="34" charset="0"/>
+              <a:cs typeface="Aptos" panose="020B0004020202020204" pitchFamily="34" charset="0"/>
+            </a:endParaRPr>
           </a:p>
         </p:txBody>
       </p:sp>
@@ -7820,18 +8292,30 @@
           <a:lstStyle/>
           <a:p>
             <a:r>
-              <a:rPr lang="en-US" dirty="0" err="1"/>
+              <a:rPr lang="en-US" dirty="0" err="1">
+                <a:latin typeface="Aptos" panose="020B0004020202020204" pitchFamily="34" charset="0"/>
+                <a:cs typeface="Aptos" panose="020B0004020202020204" pitchFamily="34" charset="0"/>
+              </a:rPr>
               <a:t>Tổng</a:t>
             </a:r>
             <a:r>
-              <a:rPr lang="en-US" dirty="0"/>
+              <a:rPr lang="en-US" dirty="0">
+                <a:latin typeface="Aptos" panose="020B0004020202020204" pitchFamily="34" charset="0"/>
+                <a:cs typeface="Aptos" panose="020B0004020202020204" pitchFamily="34" charset="0"/>
+              </a:rPr>
               <a:t> </a:t>
             </a:r>
             <a:r>
-              <a:rPr lang="en-US" dirty="0" err="1"/>
+              <a:rPr lang="en-US" dirty="0" err="1">
+                <a:latin typeface="Aptos" panose="020B0004020202020204" pitchFamily="34" charset="0"/>
+                <a:cs typeface="Aptos" panose="020B0004020202020204" pitchFamily="34" charset="0"/>
+              </a:rPr>
               <a:t>quan</a:t>
             </a:r>
-            <a:endParaRPr lang="en-US" dirty="0"/>
+            <a:endParaRPr lang="en-US" dirty="0">
+              <a:latin typeface="Aptos" panose="020B0004020202020204" pitchFamily="34" charset="0"/>
+              <a:cs typeface="Aptos" panose="020B0004020202020204" pitchFamily="34" charset="0"/>
+            </a:endParaRPr>
           </a:p>
         </p:txBody>
       </p:sp>
@@ -7863,7 +8347,8 @@
                 <a:highlight>
                   <a:srgbClr val="FFFFFF"/>
                 </a:highlight>
-                <a:latin typeface="ui-sans-serif"/>
+                <a:latin typeface="Aptos" panose="020B0004020202020204" pitchFamily="34" charset="0"/>
+                <a:cs typeface="Aptos" panose="020B0004020202020204" pitchFamily="34" charset="0"/>
               </a:rPr>
               <a:t>Mục tiêu:</a:t>
             </a:r>
@@ -7876,7 +8361,8 @@
                 <a:highlight>
                   <a:srgbClr val="FFFFFF"/>
                 </a:highlight>
-                <a:latin typeface="ui-sans-serif"/>
+                <a:latin typeface="Aptos" panose="020B0004020202020204" pitchFamily="34" charset="0"/>
+                <a:cs typeface="Aptos" panose="020B0004020202020204" pitchFamily="34" charset="0"/>
               </a:rPr>
               <a:t> Đề xuất một kiến trúc mạng mới, Transformer, dựa hoàn toàn vào cơ chế attention, không sử dụng các lớp hồi quy (RNN) hay tích chập (CNN).</a:t>
             </a:r>
@@ -7888,7 +8374,8 @@
               <a:highlight>
                 <a:srgbClr val="FFFFFF"/>
               </a:highlight>
-              <a:latin typeface="ui-sans-serif"/>
+              <a:latin typeface="Aptos" panose="020B0004020202020204" pitchFamily="34" charset="0"/>
+              <a:cs typeface="Aptos" panose="020B0004020202020204" pitchFamily="34" charset="0"/>
             </a:endParaRPr>
           </a:p>
           <a:p>
@@ -7905,7 +8392,8 @@
                 <a:highlight>
                   <a:srgbClr val="FFFFFF"/>
                 </a:highlight>
-                <a:latin typeface="ui-sans-serif"/>
+                <a:latin typeface="Aptos" panose="020B0004020202020204" pitchFamily="34" charset="0"/>
+                <a:cs typeface="Aptos" panose="020B0004020202020204" pitchFamily="34" charset="0"/>
               </a:rPr>
               <a:t>Đóng góp:</a:t>
             </a:r>
@@ -7918,7 +8406,8 @@
                 <a:highlight>
                   <a:srgbClr val="FFFFFF"/>
                 </a:highlight>
-                <a:latin typeface="ui-sans-serif"/>
+                <a:latin typeface="Aptos" panose="020B0004020202020204" pitchFamily="34" charset="0"/>
+                <a:cs typeface="Aptos" panose="020B0004020202020204" pitchFamily="34" charset="0"/>
               </a:rPr>
               <a:t> Chứng minh Transformer vượt trội về chất lượng dịch máy so với các mô hình trước đó, với khả năng song song hóa cao và thời gian huấn luyện ngắn hơn đáng kể.</a:t>
             </a:r>
@@ -7930,11 +8419,15 @@
               <a:highlight>
                 <a:srgbClr val="FFFFFF"/>
               </a:highlight>
-              <a:latin typeface="ui-sans-serif"/>
+              <a:latin typeface="Aptos" panose="020B0004020202020204" pitchFamily="34" charset="0"/>
+              <a:cs typeface="Aptos" panose="020B0004020202020204" pitchFamily="34" charset="0"/>
             </a:endParaRPr>
           </a:p>
           <a:p>
-            <a:endParaRPr lang="en-US" dirty="0"/>
+            <a:endParaRPr lang="en-US" dirty="0">
+              <a:latin typeface="Aptos" panose="020B0004020202020204" pitchFamily="34" charset="0"/>
+              <a:cs typeface="Aptos" panose="020B0004020202020204" pitchFamily="34" charset="0"/>
+            </a:endParaRPr>
           </a:p>
         </p:txBody>
       </p:sp>
@@ -8099,10 +8592,16 @@
               <a:buNone/>
             </a:pPr>
             <a:r>
-              <a:rPr lang="vi-VN" altLang="en-US" b="1"/>
+              <a:rPr lang="vi-VN" altLang="en-US" b="1">
+                <a:latin typeface="Aptos" panose="020B0004020202020204" pitchFamily="34" charset="0"/>
+                <a:cs typeface="Aptos" panose="020B0004020202020204" pitchFamily="34" charset="0"/>
+              </a:rPr>
               <a:t>3. Giải pháp: Mô hình Transformer dựa hoàn toàn trên attention</a:t>
             </a:r>
-            <a:endParaRPr lang="vi-VN" altLang="en-US"/>
+            <a:endParaRPr lang="vi-VN" altLang="en-US">
+              <a:latin typeface="Aptos" panose="020B0004020202020204" pitchFamily="34" charset="0"/>
+              <a:cs typeface="Aptos" panose="020B0004020202020204" pitchFamily="34" charset="0"/>
+            </a:endParaRPr>
           </a:p>
           <a:p>
             <a:pPr lvl="1">
@@ -8110,10 +8609,16 @@
               <a:buChar char=""/>
             </a:pPr>
             <a:r>
-              <a:rPr lang="vi-VN" altLang="en-US"/>
+              <a:rPr lang="vi-VN" altLang="en-US">
+                <a:latin typeface="Aptos" panose="020B0004020202020204" pitchFamily="34" charset="0"/>
+                <a:cs typeface="Aptos" panose="020B0004020202020204" pitchFamily="34" charset="0"/>
+              </a:rPr>
               <a:t>Transformer loại bỏ hoàn toàn các lớp hồi quy và tích chập, thay vào đó sử dụng cơ chế attention để xử lý các chuỗi.</a:t>
             </a:r>
-            <a:endParaRPr lang="vi-VN" altLang="en-US"/>
+            <a:endParaRPr lang="vi-VN" altLang="en-US">
+              <a:latin typeface="Aptos" panose="020B0004020202020204" pitchFamily="34" charset="0"/>
+              <a:cs typeface="Aptos" panose="020B0004020202020204" pitchFamily="34" charset="0"/>
+            </a:endParaRPr>
           </a:p>
           <a:p>
             <a:pPr lvl="1">
@@ -8121,10 +8626,16 @@
               <a:buChar char=""/>
             </a:pPr>
             <a:r>
-              <a:rPr lang="vi-VN" altLang="en-US"/>
+              <a:rPr lang="vi-VN" altLang="en-US">
+                <a:latin typeface="Aptos" panose="020B0004020202020204" pitchFamily="34" charset="0"/>
+                <a:cs typeface="Aptos" panose="020B0004020202020204" pitchFamily="34" charset="0"/>
+              </a:rPr>
               <a:t>Ưu điểm của Transformer:</a:t>
             </a:r>
-            <a:endParaRPr lang="vi-VN" altLang="en-US"/>
+            <a:endParaRPr lang="vi-VN" altLang="en-US">
+              <a:latin typeface="Aptos" panose="020B0004020202020204" pitchFamily="34" charset="0"/>
+              <a:cs typeface="Aptos" panose="020B0004020202020204" pitchFamily="34" charset="0"/>
+            </a:endParaRPr>
           </a:p>
           <a:p>
             <a:pPr lvl="1">
@@ -8132,10 +8643,16 @@
               <a:buChar char=""/>
             </a:pPr>
             <a:r>
-              <a:rPr lang="vi-VN" altLang="en-US"/>
+              <a:rPr lang="vi-VN" altLang="en-US">
+                <a:latin typeface="Aptos" panose="020B0004020202020204" pitchFamily="34" charset="0"/>
+                <a:cs typeface="Aptos" panose="020B0004020202020204" pitchFamily="34" charset="0"/>
+              </a:rPr>
               <a:t>Khả năng song song hóa tốt hơn, giúp giảm thời gian huấn luyện.</a:t>
             </a:r>
-            <a:endParaRPr lang="vi-VN" altLang="en-US"/>
+            <a:endParaRPr lang="vi-VN" altLang="en-US">
+              <a:latin typeface="Aptos" panose="020B0004020202020204" pitchFamily="34" charset="0"/>
+              <a:cs typeface="Aptos" panose="020B0004020202020204" pitchFamily="34" charset="0"/>
+            </a:endParaRPr>
           </a:p>
           <a:p>
             <a:pPr lvl="1">
@@ -8143,10 +8660,16 @@
               <a:buChar char=""/>
             </a:pPr>
             <a:r>
-              <a:rPr lang="vi-VN" altLang="en-US"/>
+              <a:rPr lang="vi-VN" altLang="en-US">
+                <a:latin typeface="Aptos" panose="020B0004020202020204" pitchFamily="34" charset="0"/>
+                <a:cs typeface="Aptos" panose="020B0004020202020204" pitchFamily="34" charset="0"/>
+              </a:rPr>
               <a:t>Khả năng học các phụ thuộc dài hạn tốt hơn nhờ cơ chế attention.</a:t>
             </a:r>
-            <a:endParaRPr lang="vi-VN" altLang="en-US"/>
+            <a:endParaRPr lang="vi-VN" altLang="en-US">
+              <a:latin typeface="Aptos" panose="020B0004020202020204" pitchFamily="34" charset="0"/>
+              <a:cs typeface="Aptos" panose="020B0004020202020204" pitchFamily="34" charset="0"/>
+            </a:endParaRPr>
           </a:p>
         </p:txBody>
       </p:sp>
@@ -9443,117 +9966,63 @@
 </p:sld>
 </file>
 
+<file path=ppt/tags/tag1.xml><?xml version="1.0" encoding="utf-8"?>
+<p:tagLst xmlns:p="http://schemas.openxmlformats.org/presentationml/2006/main">
+  <p:tag name="KSO_WM_SLIDE_MODEL_TYPE" val="cover"/>
+</p:tagLst>
+</file>
+
 <file path=ppt/theme/theme1.xml><?xml version="1.0" encoding="utf-8"?>
-<a:theme xmlns:a="http://schemas.openxmlformats.org/drawingml/2006/main" name="Office Theme">
+<a:theme xmlns:a="http://schemas.openxmlformats.org/drawingml/2006/main" name="Orange Waves">
   <a:themeElements>
-    <a:clrScheme name="Office">
+    <a:clrScheme name="Orange Waves 13">
       <a:dk1>
-        <a:sysClr val="windowText" lastClr="000000"/>
+        <a:srgbClr val="000000"/>
       </a:dk1>
       <a:lt1>
-        <a:sysClr val="window" lastClr="FFFFFF"/>
+        <a:srgbClr val="FFFFFF"/>
       </a:lt1>
       <a:dk2>
-        <a:srgbClr val="0E2841"/>
+        <a:srgbClr val="000000"/>
       </a:dk2>
       <a:lt2>
-        <a:srgbClr val="E8E8E8"/>
+        <a:srgbClr val="969696"/>
       </a:lt2>
       <a:accent1>
-        <a:srgbClr val="156082"/>
+        <a:srgbClr val="C73109"/>
       </a:accent1>
       <a:accent2>
-        <a:srgbClr val="E97132"/>
+        <a:srgbClr val="FF5050"/>
       </a:accent2>
       <a:accent3>
-        <a:srgbClr val="196B24"/>
+        <a:srgbClr val="FFFFFF"/>
       </a:accent3>
       <a:accent4>
-        <a:srgbClr val="0F9ED5"/>
+        <a:srgbClr val="000000"/>
       </a:accent4>
       <a:accent5>
-        <a:srgbClr val="A02B93"/>
+        <a:srgbClr val="E0ADAA"/>
       </a:accent5>
       <a:accent6>
-        <a:srgbClr val="4EA72E"/>
+        <a:srgbClr val="E74848"/>
       </a:accent6>
       <a:hlink>
-        <a:srgbClr val="467886"/>
+        <a:srgbClr val="4D4D4D"/>
       </a:hlink>
       <a:folHlink>
-        <a:srgbClr val="96607D"/>
+        <a:srgbClr val="777777"/>
       </a:folHlink>
     </a:clrScheme>
-    <a:fontScheme name="Office">
+    <a:fontScheme name="Orange Waves">
       <a:majorFont>
-        <a:latin typeface="Aptos Display"/>
-        <a:ea typeface=""/>
+        <a:latin typeface="Arial"/>
+        <a:ea typeface="SimSun"/>
         <a:cs typeface=""/>
-        <a:font script="Jpan" typeface="游ゴシック Light"/>
-        <a:font script="Hang" typeface="맑은 고딕"/>
-        <a:font script="Hans" typeface="等线 Light"/>
-        <a:font script="Hant" typeface="新細明體"/>
-        <a:font script="Arab" typeface="Times New Roman"/>
-        <a:font script="Hebr" typeface="Times New Roman"/>
-        <a:font script="Thai" typeface="Angsana New"/>
-        <a:font script="Ethi" typeface="Nyala"/>
-        <a:font script="Beng" typeface="Vrinda"/>
-        <a:font script="Gujr" typeface="Shruti"/>
-        <a:font script="Khmr" typeface="MoolBoran"/>
-        <a:font script="Knda" typeface="Tunga"/>
-        <a:font script="Guru" typeface="Raavi"/>
-        <a:font script="Cans" typeface="Euphemia"/>
-        <a:font script="Cher" typeface="Plantagenet Cherokee"/>
-        <a:font script="Yiii" typeface="Microsoft Yi Baiti"/>
-        <a:font script="Tibt" typeface="Microsoft Himalaya"/>
-        <a:font script="Thaa" typeface="MV Boli"/>
-        <a:font script="Deva" typeface="Mangal"/>
-        <a:font script="Telu" typeface="Gautami"/>
-        <a:font script="Taml" typeface="Latha"/>
-        <a:font script="Syrc" typeface="Estrangelo Edessa"/>
-        <a:font script="Orya" typeface="Kalinga"/>
-        <a:font script="Mlym" typeface="Kartika"/>
-        <a:font script="Laoo" typeface="DokChampa"/>
-        <a:font script="Sinh" typeface="Iskoola Pota"/>
-        <a:font script="Mong" typeface="Mongolian Baiti"/>
-        <a:font script="Viet" typeface="Times New Roman"/>
-        <a:font script="Uigh" typeface="Microsoft Uighur"/>
-        <a:font script="Geor" typeface="Sylfaen"/>
       </a:majorFont>
       <a:minorFont>
-        <a:latin typeface="Aptos"/>
-        <a:ea typeface=""/>
+        <a:latin typeface="Arial"/>
+        <a:ea typeface="SimSun"/>
         <a:cs typeface=""/>
-        <a:font script="Jpan" typeface="游ゴシック"/>
-        <a:font script="Hang" typeface="맑은 고딕"/>
-        <a:font script="Hans" typeface="等线"/>
-        <a:font script="Hant" typeface="新細明體"/>
-        <a:font script="Arab" typeface="Arial"/>
-        <a:font script="Hebr" typeface="Arial"/>
-        <a:font script="Thai" typeface="Cordia New"/>
-        <a:font script="Ethi" typeface="Nyala"/>
-        <a:font script="Beng" typeface="Vrinda"/>
-        <a:font script="Gujr" typeface="Shruti"/>
-        <a:font script="Khmr" typeface="DaunPenh"/>
-        <a:font script="Knda" typeface="Tunga"/>
-        <a:font script="Guru" typeface="Raavi"/>
-        <a:font script="Cans" typeface="Euphemia"/>
-        <a:font script="Cher" typeface="Plantagenet Cherokee"/>
-        <a:font script="Yiii" typeface="Microsoft Yi Baiti"/>
-        <a:font script="Tibt" typeface="Microsoft Himalaya"/>
-        <a:font script="Thaa" typeface="MV Boli"/>
-        <a:font script="Deva" typeface="Mangal"/>
-        <a:font script="Telu" typeface="Gautami"/>
-        <a:font script="Taml" typeface="Latha"/>
-        <a:font script="Syrc" typeface="Estrangelo Edessa"/>
-        <a:font script="Orya" typeface="Kalinga"/>
-        <a:font script="Mlym" typeface="Kartika"/>
-        <a:font script="Laoo" typeface="DokChampa"/>
-        <a:font script="Sinh" typeface="Iskoola Pota"/>
-        <a:font script="Mong" typeface="Mongolian Baiti"/>
-        <a:font script="Viet" typeface="Arial"/>
-        <a:font script="Uigh" typeface="Microsoft Uighur"/>
-        <a:font script="Geor" typeface="Sylfaen"/>
       </a:minorFont>
     </a:fontScheme>
     <a:fmtScheme name="Office">
@@ -9615,6 +10084,13 @@
         </a:gradFill>
       </a:fillStyleLst>
       <a:lnStyleLst>
+        <a:ln w="6350" cap="flat" cmpd="sng" algn="ctr">
+          <a:solidFill>
+            <a:schemeClr val="phClr"/>
+          </a:solidFill>
+          <a:prstDash val="solid"/>
+          <a:miter lim="800000"/>
+        </a:ln>
         <a:ln w="12700" cap="flat" cmpd="sng" algn="ctr">
           <a:solidFill>
             <a:schemeClr val="phClr"/>
@@ -9623,13 +10099,6 @@
           <a:miter lim="800000"/>
         </a:ln>
         <a:ln w="19050" cap="flat" cmpd="sng" algn="ctr">
-          <a:solidFill>
-            <a:schemeClr val="phClr"/>
-          </a:solidFill>
-          <a:prstDash val="solid"/>
-          <a:miter lim="800000"/>
-        </a:ln>
-        <a:ln w="25400" cap="flat" cmpd="sng" algn="ctr">
           <a:solidFill>
             <a:schemeClr val="phClr"/>
           </a:solidFill>
@@ -9695,26 +10164,672 @@
     </a:fmtScheme>
   </a:themeElements>
   <a:objectDefaults>
+    <a:spDef>
+      <a:spPr bwMode="auto">
+        <a:xfrm>
+          <a:off x="0" y="0"/>
+          <a:ext cx="1" cy="1"/>
+        </a:xfrm>
+        <a:custGeom>
+          <a:avLst/>
+          <a:gdLst/>
+          <a:ahLst/>
+          <a:cxnLst/>
+          <a:rect l="0" t="0" r="0" b="0"/>
+          <a:pathLst/>
+        </a:custGeom>
+        <a:gradFill rotWithShape="0">
+          <a:gsLst>
+            <a:gs pos="0">
+              <a:schemeClr val="accent1"/>
+            </a:gs>
+            <a:gs pos="100000">
+              <a:schemeClr val="accent2"/>
+            </a:gs>
+          </a:gsLst>
+          <a:lin ang="5400000" scaled="1"/>
+        </a:gradFill>
+        <a:ln w="9525" cap="flat" cmpd="sng" algn="ctr">
+          <a:solidFill>
+            <a:schemeClr val="accent1"/>
+          </a:solidFill>
+          <a:prstDash val="solid"/>
+          <a:round/>
+          <a:headEnd type="none" w="med" len="med"/>
+          <a:tailEnd type="none" w="med" len="med"/>
+        </a:ln>
+      </a:spPr>
+      <a:bodyPr vert="horz" wrap="none" lIns="91440" tIns="45720" rIns="91440" bIns="45720" numCol="1" anchor="ctr" anchorCtr="0" compatLnSpc="1"/>
+      <a:lstStyle>
+        <a:defPPr marL="0" marR="0" indent="0" algn="l" defTabSz="914400" rtl="0" eaLnBrk="1" fontAlgn="base" latinLnBrk="0" hangingPunct="1">
+          <a:lnSpc>
+            <a:spcPct val="100000"/>
+          </a:lnSpc>
+          <a:spcBef>
+            <a:spcPct val="0"/>
+          </a:spcBef>
+          <a:spcAft>
+            <a:spcPct val="0"/>
+          </a:spcAft>
+          <a:buClrTx/>
+          <a:buSzTx/>
+          <a:buFontTx/>
+          <a:buNone/>
+          <a:defRPr kumimoji="0" lang="zh-CN" altLang="en-US" sz="1800" b="0" i="0" u="none" strike="noStrike" cap="none" normalizeH="0" baseline="0" smtClean="0">
+            <a:ln>
+              <a:noFill/>
+            </a:ln>
+            <a:solidFill>
+              <a:schemeClr val="tx1"/>
+            </a:solidFill>
+            <a:effectLst/>
+            <a:latin typeface="Arial" panose="020B0604020202090204" pitchFamily="34" charset="0"/>
+            <a:ea typeface="SimSun" pitchFamily="2" charset="-122"/>
+          </a:defRPr>
+        </a:defPPr>
+      </a:lstStyle>
+    </a:spDef>
     <a:lnDef>
-      <a:spPr/>
-      <a:bodyPr/>
-      <a:lstStyle/>
-      <a:style>
-        <a:lnRef idx="2">
-          <a:schemeClr val="accent1"/>
-        </a:lnRef>
-        <a:fillRef idx="0">
-          <a:schemeClr val="accent1"/>
-        </a:fillRef>
-        <a:effectRef idx="1">
-          <a:schemeClr val="accent1"/>
-        </a:effectRef>
-        <a:fontRef idx="minor">
-          <a:schemeClr val="tx1"/>
-        </a:fontRef>
-      </a:style>
+      <a:spPr bwMode="auto">
+        <a:xfrm>
+          <a:off x="0" y="0"/>
+          <a:ext cx="1" cy="1"/>
+        </a:xfrm>
+        <a:custGeom>
+          <a:avLst/>
+          <a:gdLst/>
+          <a:ahLst/>
+          <a:cxnLst/>
+          <a:rect l="0" t="0" r="0" b="0"/>
+          <a:pathLst/>
+        </a:custGeom>
+        <a:gradFill rotWithShape="0">
+          <a:gsLst>
+            <a:gs pos="0">
+              <a:schemeClr val="accent1"/>
+            </a:gs>
+            <a:gs pos="100000">
+              <a:schemeClr val="accent2"/>
+            </a:gs>
+          </a:gsLst>
+          <a:lin ang="5400000" scaled="1"/>
+        </a:gradFill>
+        <a:ln w="9525" cap="flat" cmpd="sng" algn="ctr">
+          <a:solidFill>
+            <a:schemeClr val="accent1"/>
+          </a:solidFill>
+          <a:prstDash val="solid"/>
+          <a:round/>
+          <a:headEnd type="none" w="med" len="med"/>
+          <a:tailEnd type="none" w="med" len="med"/>
+        </a:ln>
+      </a:spPr>
+      <a:bodyPr vert="horz" wrap="none" lIns="91440" tIns="45720" rIns="91440" bIns="45720" numCol="1" anchor="ctr" anchorCtr="0" compatLnSpc="1"/>
+      <a:lstStyle>
+        <a:defPPr marL="0" marR="0" indent="0" algn="l" defTabSz="914400" rtl="0" eaLnBrk="1" fontAlgn="base" latinLnBrk="0" hangingPunct="1">
+          <a:lnSpc>
+            <a:spcPct val="100000"/>
+          </a:lnSpc>
+          <a:spcBef>
+            <a:spcPct val="0"/>
+          </a:spcBef>
+          <a:spcAft>
+            <a:spcPct val="0"/>
+          </a:spcAft>
+          <a:buClrTx/>
+          <a:buSzTx/>
+          <a:buFontTx/>
+          <a:buNone/>
+          <a:defRPr kumimoji="0" lang="zh-CN" altLang="en-US" sz="1800" b="0" i="0" u="none" strike="noStrike" cap="none" normalizeH="0" baseline="0" smtClean="0">
+            <a:ln>
+              <a:noFill/>
+            </a:ln>
+            <a:solidFill>
+              <a:schemeClr val="tx1"/>
+            </a:solidFill>
+            <a:effectLst/>
+            <a:latin typeface="Arial" panose="020B0604020202090204" pitchFamily="34" charset="0"/>
+            <a:ea typeface="SimSun" pitchFamily="2" charset="-122"/>
+          </a:defRPr>
+        </a:defPPr>
+      </a:lstStyle>
     </a:lnDef>
   </a:objectDefaults>
+  <a:extraClrSchemeLst>
+    <a:extraClrScheme>
+      <a:clrScheme name="Orange Waves 1">
+        <a:dk1>
+          <a:srgbClr val="000000"/>
+        </a:dk1>
+        <a:lt1>
+          <a:srgbClr val="FFFFFF"/>
+        </a:lt1>
+        <a:dk2>
+          <a:srgbClr val="000000"/>
+        </a:dk2>
+        <a:lt2>
+          <a:srgbClr val="808080"/>
+        </a:lt2>
+        <a:accent1>
+          <a:srgbClr val="BBE0E3"/>
+        </a:accent1>
+        <a:accent2>
+          <a:srgbClr val="333399"/>
+        </a:accent2>
+        <a:accent3>
+          <a:srgbClr val="FFFFFF"/>
+        </a:accent3>
+        <a:accent4>
+          <a:srgbClr val="000000"/>
+        </a:accent4>
+        <a:accent5>
+          <a:srgbClr val="DAEDEF"/>
+        </a:accent5>
+        <a:accent6>
+          <a:srgbClr val="2D2D8A"/>
+        </a:accent6>
+        <a:hlink>
+          <a:srgbClr val="009999"/>
+        </a:hlink>
+        <a:folHlink>
+          <a:srgbClr val="99CC00"/>
+        </a:folHlink>
+      </a:clrScheme>
+      <a:clrMap bg1="lt1" tx1="dk1" bg2="lt2" tx2="dk2" accent1="accent1" accent2="accent2" accent3="accent3" accent4="accent4" accent5="accent5" accent6="accent6" hlink="hlink" folHlink="folHlink"/>
+    </a:extraClrScheme>
+    <a:extraClrScheme>
+      <a:clrScheme name="Orange Waves 2">
+        <a:dk1>
+          <a:srgbClr val="000000"/>
+        </a:dk1>
+        <a:lt1>
+          <a:srgbClr val="FFFFFF"/>
+        </a:lt1>
+        <a:dk2>
+          <a:srgbClr val="000000"/>
+        </a:dk2>
+        <a:lt2>
+          <a:srgbClr val="969696"/>
+        </a:lt2>
+        <a:accent1>
+          <a:srgbClr val="FBDF53"/>
+        </a:accent1>
+        <a:accent2>
+          <a:srgbClr val="FF9966"/>
+        </a:accent2>
+        <a:accent3>
+          <a:srgbClr val="FFFFFF"/>
+        </a:accent3>
+        <a:accent4>
+          <a:srgbClr val="000000"/>
+        </a:accent4>
+        <a:accent5>
+          <a:srgbClr val="FDECB3"/>
+        </a:accent5>
+        <a:accent6>
+          <a:srgbClr val="E78A5C"/>
+        </a:accent6>
+        <a:hlink>
+          <a:srgbClr val="CC3300"/>
+        </a:hlink>
+        <a:folHlink>
+          <a:srgbClr val="996600"/>
+        </a:folHlink>
+      </a:clrScheme>
+      <a:clrMap bg1="lt1" tx1="dk1" bg2="lt2" tx2="dk2" accent1="accent1" accent2="accent2" accent3="accent3" accent4="accent4" accent5="accent5" accent6="accent6" hlink="hlink" folHlink="folHlink"/>
+    </a:extraClrScheme>
+    <a:extraClrScheme>
+      <a:clrScheme name="Orange Waves 3">
+        <a:dk1>
+          <a:srgbClr val="000000"/>
+        </a:dk1>
+        <a:lt1>
+          <a:srgbClr val="FFFFFF"/>
+        </a:lt1>
+        <a:dk2>
+          <a:srgbClr val="000000"/>
+        </a:dk2>
+        <a:lt2>
+          <a:srgbClr val="808080"/>
+        </a:lt2>
+        <a:accent1>
+          <a:srgbClr val="99CCFF"/>
+        </a:accent1>
+        <a:accent2>
+          <a:srgbClr val="CCCCFF"/>
+        </a:accent2>
+        <a:accent3>
+          <a:srgbClr val="FFFFFF"/>
+        </a:accent3>
+        <a:accent4>
+          <a:srgbClr val="000000"/>
+        </a:accent4>
+        <a:accent5>
+          <a:srgbClr val="CAE2FF"/>
+        </a:accent5>
+        <a:accent6>
+          <a:srgbClr val="B9B9E7"/>
+        </a:accent6>
+        <a:hlink>
+          <a:srgbClr val="3333CC"/>
+        </a:hlink>
+        <a:folHlink>
+          <a:srgbClr val="AF67FF"/>
+        </a:folHlink>
+      </a:clrScheme>
+      <a:clrMap bg1="lt1" tx1="dk1" bg2="lt2" tx2="dk2" accent1="accent1" accent2="accent2" accent3="accent3" accent4="accent4" accent5="accent5" accent6="accent6" hlink="hlink" folHlink="folHlink"/>
+    </a:extraClrScheme>
+    <a:extraClrScheme>
+      <a:clrScheme name="Orange Waves 4">
+        <a:dk1>
+          <a:srgbClr val="000000"/>
+        </a:dk1>
+        <a:lt1>
+          <a:srgbClr val="DEF6F1"/>
+        </a:lt1>
+        <a:dk2>
+          <a:srgbClr val="000000"/>
+        </a:dk2>
+        <a:lt2>
+          <a:srgbClr val="969696"/>
+        </a:lt2>
+        <a:accent1>
+          <a:srgbClr val="FFFFFF"/>
+        </a:accent1>
+        <a:accent2>
+          <a:srgbClr val="8DC6FF"/>
+        </a:accent2>
+        <a:accent3>
+          <a:srgbClr val="ECFAF7"/>
+        </a:accent3>
+        <a:accent4>
+          <a:srgbClr val="000000"/>
+        </a:accent4>
+        <a:accent5>
+          <a:srgbClr val="FFFFFF"/>
+        </a:accent5>
+        <a:accent6>
+          <a:srgbClr val="7FB3E7"/>
+        </a:accent6>
+        <a:hlink>
+          <a:srgbClr val="0066CC"/>
+        </a:hlink>
+        <a:folHlink>
+          <a:srgbClr val="00A800"/>
+        </a:folHlink>
+      </a:clrScheme>
+      <a:clrMap bg1="lt1" tx1="dk1" bg2="lt2" tx2="dk2" accent1="accent1" accent2="accent2" accent3="accent3" accent4="accent4" accent5="accent5" accent6="accent6" hlink="hlink" folHlink="folHlink"/>
+    </a:extraClrScheme>
+    <a:extraClrScheme>
+      <a:clrScheme name="Orange Waves 5">
+        <a:dk1>
+          <a:srgbClr val="000000"/>
+        </a:dk1>
+        <a:lt1>
+          <a:srgbClr val="FFFFD9"/>
+        </a:lt1>
+        <a:dk2>
+          <a:srgbClr val="000000"/>
+        </a:dk2>
+        <a:lt2>
+          <a:srgbClr val="777777"/>
+        </a:lt2>
+        <a:accent1>
+          <a:srgbClr val="FFFFF7"/>
+        </a:accent1>
+        <a:accent2>
+          <a:srgbClr val="33CCCC"/>
+        </a:accent2>
+        <a:accent3>
+          <a:srgbClr val="FFFFE9"/>
+        </a:accent3>
+        <a:accent4>
+          <a:srgbClr val="000000"/>
+        </a:accent4>
+        <a:accent5>
+          <a:srgbClr val="FFFFFA"/>
+        </a:accent5>
+        <a:accent6>
+          <a:srgbClr val="2DB9B9"/>
+        </a:accent6>
+        <a:hlink>
+          <a:srgbClr val="FF5050"/>
+        </a:hlink>
+        <a:folHlink>
+          <a:srgbClr val="FF9900"/>
+        </a:folHlink>
+      </a:clrScheme>
+      <a:clrMap bg1="lt1" tx1="dk1" bg2="lt2" tx2="dk2" accent1="accent1" accent2="accent2" accent3="accent3" accent4="accent4" accent5="accent5" accent6="accent6" hlink="hlink" folHlink="folHlink"/>
+    </a:extraClrScheme>
+    <a:extraClrScheme>
+      <a:clrScheme name="Orange Waves 6">
+        <a:dk1>
+          <a:srgbClr val="005A58"/>
+        </a:dk1>
+        <a:lt1>
+          <a:srgbClr val="FFFFFF"/>
+        </a:lt1>
+        <a:dk2>
+          <a:srgbClr val="008080"/>
+        </a:dk2>
+        <a:lt2>
+          <a:srgbClr val="FFFF99"/>
+        </a:lt2>
+        <a:accent1>
+          <a:srgbClr val="006462"/>
+        </a:accent1>
+        <a:accent2>
+          <a:srgbClr val="6D6FC7"/>
+        </a:accent2>
+        <a:accent3>
+          <a:srgbClr val="AAC0C0"/>
+        </a:accent3>
+        <a:accent4>
+          <a:srgbClr val="DADADA"/>
+        </a:accent4>
+        <a:accent5>
+          <a:srgbClr val="AAB8B7"/>
+        </a:accent5>
+        <a:accent6>
+          <a:srgbClr val="6264B4"/>
+        </a:accent6>
+        <a:hlink>
+          <a:srgbClr val="00FFFF"/>
+        </a:hlink>
+        <a:folHlink>
+          <a:srgbClr val="00FF00"/>
+        </a:folHlink>
+      </a:clrScheme>
+      <a:clrMap bg1="dk2" tx1="lt1" bg2="dk1" tx2="lt2" accent1="accent1" accent2="accent2" accent3="accent3" accent4="accent4" accent5="accent5" accent6="accent6" hlink="hlink" folHlink="folHlink"/>
+    </a:extraClrScheme>
+    <a:extraClrScheme>
+      <a:clrScheme name="Orange Waves 7">
+        <a:dk1>
+          <a:srgbClr val="5C1F00"/>
+        </a:dk1>
+        <a:lt1>
+          <a:srgbClr val="FFFFFF"/>
+        </a:lt1>
+        <a:dk2>
+          <a:srgbClr val="800000"/>
+        </a:dk2>
+        <a:lt2>
+          <a:srgbClr val="DFD293"/>
+        </a:lt2>
+        <a:accent1>
+          <a:srgbClr val="CC3300"/>
+        </a:accent1>
+        <a:accent2>
+          <a:srgbClr val="BE7960"/>
+        </a:accent2>
+        <a:accent3>
+          <a:srgbClr val="C0AAAA"/>
+        </a:accent3>
+        <a:accent4>
+          <a:srgbClr val="DADADA"/>
+        </a:accent4>
+        <a:accent5>
+          <a:srgbClr val="E2ADAA"/>
+        </a:accent5>
+        <a:accent6>
+          <a:srgbClr val="AC6D56"/>
+        </a:accent6>
+        <a:hlink>
+          <a:srgbClr val="FFFF99"/>
+        </a:hlink>
+        <a:folHlink>
+          <a:srgbClr val="D3A219"/>
+        </a:folHlink>
+      </a:clrScheme>
+      <a:clrMap bg1="dk2" tx1="lt1" bg2="dk1" tx2="lt2" accent1="accent1" accent2="accent2" accent3="accent3" accent4="accent4" accent5="accent5" accent6="accent6" hlink="hlink" folHlink="folHlink"/>
+    </a:extraClrScheme>
+    <a:extraClrScheme>
+      <a:clrScheme name="Orange Waves 8">
+        <a:dk1>
+          <a:srgbClr val="003366"/>
+        </a:dk1>
+        <a:lt1>
+          <a:srgbClr val="FFFFFF"/>
+        </a:lt1>
+        <a:dk2>
+          <a:srgbClr val="000099"/>
+        </a:dk2>
+        <a:lt2>
+          <a:srgbClr val="CCFFFF"/>
+        </a:lt2>
+        <a:accent1>
+          <a:srgbClr val="3366CC"/>
+        </a:accent1>
+        <a:accent2>
+          <a:srgbClr val="00B000"/>
+        </a:accent2>
+        <a:accent3>
+          <a:srgbClr val="AAAACA"/>
+        </a:accent3>
+        <a:accent4>
+          <a:srgbClr val="DADADA"/>
+        </a:accent4>
+        <a:accent5>
+          <a:srgbClr val="ADB8E2"/>
+        </a:accent5>
+        <a:accent6>
+          <a:srgbClr val="009F00"/>
+        </a:accent6>
+        <a:hlink>
+          <a:srgbClr val="66CCFF"/>
+        </a:hlink>
+        <a:folHlink>
+          <a:srgbClr val="FFE701"/>
+        </a:folHlink>
+      </a:clrScheme>
+      <a:clrMap bg1="dk2" tx1="lt1" bg2="dk1" tx2="lt2" accent1="accent1" accent2="accent2" accent3="accent3" accent4="accent4" accent5="accent5" accent6="accent6" hlink="hlink" folHlink="folHlink"/>
+    </a:extraClrScheme>
+    <a:extraClrScheme>
+      <a:clrScheme name="Orange Waves 9">
+        <a:dk1>
+          <a:srgbClr val="336699"/>
+        </a:dk1>
+        <a:lt1>
+          <a:srgbClr val="FFFFFF"/>
+        </a:lt1>
+        <a:dk2>
+          <a:srgbClr val="000000"/>
+        </a:dk2>
+        <a:lt2>
+          <a:srgbClr val="E3EBF1"/>
+        </a:lt2>
+        <a:accent1>
+          <a:srgbClr val="003399"/>
+        </a:accent1>
+        <a:accent2>
+          <a:srgbClr val="468A4B"/>
+        </a:accent2>
+        <a:accent3>
+          <a:srgbClr val="AAAAAA"/>
+        </a:accent3>
+        <a:accent4>
+          <a:srgbClr val="DADADA"/>
+        </a:accent4>
+        <a:accent5>
+          <a:srgbClr val="AAADCA"/>
+        </a:accent5>
+        <a:accent6>
+          <a:srgbClr val="3F7D43"/>
+        </a:accent6>
+        <a:hlink>
+          <a:srgbClr val="66CCFF"/>
+        </a:hlink>
+        <a:folHlink>
+          <a:srgbClr val="F0E500"/>
+        </a:folHlink>
+      </a:clrScheme>
+      <a:clrMap bg1="dk2" tx1="lt1" bg2="dk1" tx2="lt2" accent1="accent1" accent2="accent2" accent3="accent3" accent4="accent4" accent5="accent5" accent6="accent6" hlink="hlink" folHlink="folHlink"/>
+    </a:extraClrScheme>
+    <a:extraClrScheme>
+      <a:clrScheme name="Orange Waves 10">
+        <a:dk1>
+          <a:srgbClr val="777777"/>
+        </a:dk1>
+        <a:lt1>
+          <a:srgbClr val="FFFFFF"/>
+        </a:lt1>
+        <a:dk2>
+          <a:srgbClr val="686B5D"/>
+        </a:dk2>
+        <a:lt2>
+          <a:srgbClr val="D1D1CB"/>
+        </a:lt2>
+        <a:accent1>
+          <a:srgbClr val="909082"/>
+        </a:accent1>
+        <a:accent2>
+          <a:srgbClr val="809EA8"/>
+        </a:accent2>
+        <a:accent3>
+          <a:srgbClr val="B9BAB6"/>
+        </a:accent3>
+        <a:accent4>
+          <a:srgbClr val="DADADA"/>
+        </a:accent4>
+        <a:accent5>
+          <a:srgbClr val="C6C6C1"/>
+        </a:accent5>
+        <a:accent6>
+          <a:srgbClr val="738F98"/>
+        </a:accent6>
+        <a:hlink>
+          <a:srgbClr val="FFCC66"/>
+        </a:hlink>
+        <a:folHlink>
+          <a:srgbClr val="E9DCB9"/>
+        </a:folHlink>
+      </a:clrScheme>
+      <a:clrMap bg1="dk2" tx1="lt1" bg2="dk1" tx2="lt2" accent1="accent1" accent2="accent2" accent3="accent3" accent4="accent4" accent5="accent5" accent6="accent6" hlink="hlink" folHlink="folHlink"/>
+    </a:extraClrScheme>
+    <a:extraClrScheme>
+      <a:clrScheme name="Orange Waves 11">
+        <a:dk1>
+          <a:srgbClr val="3E3E5C"/>
+        </a:dk1>
+        <a:lt1>
+          <a:srgbClr val="FFFFFF"/>
+        </a:lt1>
+        <a:dk2>
+          <a:srgbClr val="666699"/>
+        </a:dk2>
+        <a:lt2>
+          <a:srgbClr val="FFFFFF"/>
+        </a:lt2>
+        <a:accent1>
+          <a:srgbClr val="60597B"/>
+        </a:accent1>
+        <a:accent2>
+          <a:srgbClr val="6666FF"/>
+        </a:accent2>
+        <a:accent3>
+          <a:srgbClr val="B8B8CA"/>
+        </a:accent3>
+        <a:accent4>
+          <a:srgbClr val="DADADA"/>
+        </a:accent4>
+        <a:accent5>
+          <a:srgbClr val="B6B5BF"/>
+        </a:accent5>
+        <a:accent6>
+          <a:srgbClr val="5C5CE7"/>
+        </a:accent6>
+        <a:hlink>
+          <a:srgbClr val="99CCFF"/>
+        </a:hlink>
+        <a:folHlink>
+          <a:srgbClr val="FFFF99"/>
+        </a:folHlink>
+      </a:clrScheme>
+      <a:clrMap bg1="dk2" tx1="lt1" bg2="dk1" tx2="lt2" accent1="accent1" accent2="accent2" accent3="accent3" accent4="accent4" accent5="accent5" accent6="accent6" hlink="hlink" folHlink="folHlink"/>
+    </a:extraClrScheme>
+    <a:extraClrScheme>
+      <a:clrScheme name="Orange Waves 12">
+        <a:dk1>
+          <a:srgbClr val="2D2015"/>
+        </a:dk1>
+        <a:lt1>
+          <a:srgbClr val="FFFFFF"/>
+        </a:lt1>
+        <a:dk2>
+          <a:srgbClr val="523E26"/>
+        </a:dk2>
+        <a:lt2>
+          <a:srgbClr val="DFC08D"/>
+        </a:lt2>
+        <a:accent1>
+          <a:srgbClr val="8C7B70"/>
+        </a:accent1>
+        <a:accent2>
+          <a:srgbClr val="8F5F2F"/>
+        </a:accent2>
+        <a:accent3>
+          <a:srgbClr val="B3AFAC"/>
+        </a:accent3>
+        <a:accent4>
+          <a:srgbClr val="DADADA"/>
+        </a:accent4>
+        <a:accent5>
+          <a:srgbClr val="C5BFBB"/>
+        </a:accent5>
+        <a:accent6>
+          <a:srgbClr val="81552A"/>
+        </a:accent6>
+        <a:hlink>
+          <a:srgbClr val="CCB400"/>
+        </a:hlink>
+        <a:folHlink>
+          <a:srgbClr val="8C9EA0"/>
+        </a:folHlink>
+      </a:clrScheme>
+      <a:clrMap bg1="dk2" tx1="lt1" bg2="dk1" tx2="lt2" accent1="accent1" accent2="accent2" accent3="accent3" accent4="accent4" accent5="accent5" accent6="accent6" hlink="hlink" folHlink="folHlink"/>
+    </a:extraClrScheme>
+    <a:extraClrScheme>
+      <a:clrScheme name="Orange Waves 13">
+        <a:dk1>
+          <a:srgbClr val="000000"/>
+        </a:dk1>
+        <a:lt1>
+          <a:srgbClr val="FFFFFF"/>
+        </a:lt1>
+        <a:dk2>
+          <a:srgbClr val="000000"/>
+        </a:dk2>
+        <a:lt2>
+          <a:srgbClr val="969696"/>
+        </a:lt2>
+        <a:accent1>
+          <a:srgbClr val="C73109"/>
+        </a:accent1>
+        <a:accent2>
+          <a:srgbClr val="FF5050"/>
+        </a:accent2>
+        <a:accent3>
+          <a:srgbClr val="FFFFFF"/>
+        </a:accent3>
+        <a:accent4>
+          <a:srgbClr val="000000"/>
+        </a:accent4>
+        <a:accent5>
+          <a:srgbClr val="E0ADAA"/>
+        </a:accent5>
+        <a:accent6>
+          <a:srgbClr val="E74848"/>
+        </a:accent6>
+        <a:hlink>
+          <a:srgbClr val="4D4D4D"/>
+        </a:hlink>
+        <a:folHlink>
+          <a:srgbClr val="777777"/>
+        </a:folHlink>
+      </a:clrScheme>
+      <a:clrMap bg1="lt1" tx1="dk1" bg2="lt2" tx2="dk2" accent1="accent1" accent2="accent2" accent3="accent3" accent4="accent4" accent5="accent5" accent6="accent6" hlink="hlink" folHlink="folHlink"/>
+    </a:extraClrScheme>
+  </a:extraClrSchemeLst>
   <a:extLst>
     <a:ext uri="{05A4C25C-085E-4340-85A3-A5531E510DB2}">
       <thm15:themeFamily xmlns:thm15="http://schemas.microsoft.com/office/thememl/2012/main" name="Office Theme" id="{62F939B6-93AF-4DB8-9C6B-D6C7DFDC589F}" vid="{4A3C46E8-61CC-4603-A589-7422A47A8E4A}"/>

</xml_diff>